<commit_message>
updated form name fields and updated content for about.html
</commit_message>
<xml_diff>
--- a/ppt/portfolio.pptx
+++ b/ppt/portfolio.pptx
@@ -6,15 +6,16 @@
   </p:sldMasterIdLst>
   <p:sldIdLst>
     <p:sldId id="256" r:id="rId2"/>
-    <p:sldId id="262" r:id="rId3"/>
-    <p:sldId id="257" r:id="rId4"/>
-    <p:sldId id="258" r:id="rId5"/>
-    <p:sldId id="259" r:id="rId6"/>
+    <p:sldId id="257" r:id="rId3"/>
+    <p:sldId id="263" r:id="rId4"/>
+    <p:sldId id="264" r:id="rId5"/>
+    <p:sldId id="266" r:id="rId6"/>
     <p:sldId id="260" r:id="rId7"/>
     <p:sldId id="261" r:id="rId8"/>
-    <p:sldId id="263" r:id="rId9"/>
-    <p:sldId id="264" r:id="rId10"/>
+    <p:sldId id="258" r:id="rId9"/>
+    <p:sldId id="259" r:id="rId10"/>
     <p:sldId id="265" r:id="rId11"/>
+    <p:sldId id="267" r:id="rId12"/>
   </p:sldIdLst>
   <p:sldSz cx="12192000" cy="6858000"/>
   <p:notesSz cx="6858000" cy="9144000"/>
@@ -124,7 +125,7 @@
 <file path=ppt/revisionInfo.xml><?xml version="1.0" encoding="utf-8"?>
 <p1510:revInfo xmlns:a="http://schemas.openxmlformats.org/drawingml/2006/main" xmlns:r="http://schemas.openxmlformats.org/officeDocument/2006/relationships" xmlns:p1510="http://schemas.microsoft.com/office/powerpoint/2015/10/main">
   <p1510:revLst>
-    <p1510:client id="{30AE79C9-11C5-4974-AAF3-58996AFCA6E5}" v="2857" dt="2021-03-09T15:20:27.244"/>
+    <p1510:client id="{30AE79C9-11C5-4974-AAF3-58996AFCA6E5}" v="3610" dt="2021-03-10T01:30:15.125"/>
   </p1510:revLst>
 </p1510:revInfo>
 </file>
@@ -3200,7 +3201,7 @@
         </p:nvSpPr>
         <p:spPr>
           <a:xfrm>
-            <a:off x="4901762" y="1912881"/>
+            <a:off x="2409966" y="1957377"/>
             <a:ext cx="2743199" cy="1754326"/>
           </a:xfrm>
           <a:prstGeom prst="rect">
@@ -3289,7 +3290,7 @@
         </p:nvSpPr>
         <p:spPr>
           <a:xfrm>
-            <a:off x="4901761" y="4126624"/>
+            <a:off x="2409965" y="4171120"/>
             <a:ext cx="3321268" cy="1754326"/>
           </a:xfrm>
           <a:prstGeom prst="rect">
@@ -3353,6 +3354,104 @@
                 <a:cs typeface="Calibri"/>
               </a:rPr>
               <a:t>Rainbow text</a:t>
+            </a:r>
+            <a:endParaRPr lang="zh-TW" altLang="en-US" sz="3600" dirty="0">
+              <a:solidFill>
+                <a:srgbClr val="8CE1EB"/>
+              </a:solidFill>
+              <a:ea typeface="新細明體"/>
+              <a:cs typeface="Calibri"/>
+            </a:endParaRPr>
+          </a:p>
+        </p:txBody>
+      </p:sp>
+      <p:sp>
+        <p:nvSpPr>
+          <p:cNvPr id="5" name="文字方塊 4">
+            <a:extLst>
+              <a:ext uri="{FF2B5EF4-FFF2-40B4-BE49-F238E27FC236}">
+                <a16:creationId xmlns:a16="http://schemas.microsoft.com/office/drawing/2014/main" id="{58748C0D-4144-4C63-8011-2ABC84BD1E0A}"/>
+              </a:ext>
+            </a:extLst>
+          </p:cNvPr>
+          <p:cNvSpPr txBox="1"/>
+          <p:nvPr/>
+        </p:nvSpPr>
+        <p:spPr>
+          <a:xfrm>
+            <a:off x="6703864" y="1857260"/>
+            <a:ext cx="3866731" cy="3970318"/>
+          </a:xfrm>
+          <a:prstGeom prst="rect">
+            <a:avLst/>
+          </a:prstGeom>
+          <a:noFill/>
+        </p:spPr>
+        <p:txBody>
+          <a:bodyPr rot="0" spcFirstLastPara="0" vertOverflow="overflow" horzOverflow="overflow" vert="horz" wrap="square" lIns="91440" tIns="45720" rIns="91440" bIns="45720" numCol="1" spcCol="0" rtlCol="0" fromWordArt="0" anchor="t" anchorCtr="0" forceAA="0" compatLnSpc="1">
+            <a:prstTxWarp prst="textNoShape">
+              <a:avLst/>
+            </a:prstTxWarp>
+            <a:spAutoFit/>
+          </a:bodyPr>
+          <a:lstStyle/>
+          <a:p>
+            <a:r>
+              <a:rPr lang="zh-TW" altLang="en-US" sz="3600" dirty="0">
+                <a:solidFill>
+                  <a:srgbClr val="8CE1EB"/>
+                </a:solidFill>
+                <a:ea typeface="新細明體"/>
+              </a:rPr>
+              <a:t>Future </a:t>
+            </a:r>
+            <a:r>
+              <a:rPr lang="zh-TW" altLang="en-US" sz="3600">
+                <a:solidFill>
+                  <a:srgbClr val="8CE1EB"/>
+                </a:solidFill>
+                <a:ea typeface="新細明體"/>
+              </a:rPr>
+              <a:t>updates:</a:t>
+            </a:r>
+            <a:endParaRPr lang="zh-TW" altLang="en-US" sz="3600">
+              <a:solidFill>
+                <a:srgbClr val="8CE1EB"/>
+              </a:solidFill>
+              <a:ea typeface="新細明體"/>
+              <a:cs typeface="Calibri"/>
+            </a:endParaRPr>
+          </a:p>
+          <a:p>
+            <a:pPr marL="571500" indent="-571500">
+              <a:buFont typeface="Arial"/>
+              <a:buChar char="•"/>
+            </a:pPr>
+            <a:r>
+              <a:rPr lang="zh-TW" altLang="en-US" sz="3600">
+                <a:solidFill>
+                  <a:srgbClr val="8CE1EB"/>
+                </a:solidFill>
+                <a:ea typeface="新細明體"/>
+                <a:cs typeface="Calibri"/>
+              </a:rPr>
+              <a:t>Toggle between dark theme and light theme</a:t>
+            </a:r>
+          </a:p>
+          <a:p>
+            <a:pPr marL="571500" indent="-571500">
+              <a:buFont typeface="Arial"/>
+              <a:buChar char="•"/>
+            </a:pPr>
+            <a:r>
+              <a:rPr lang="zh-TW" altLang="en-US" sz="3600">
+                <a:solidFill>
+                  <a:srgbClr val="8CE1EB"/>
+                </a:solidFill>
+                <a:ea typeface="新細明體"/>
+                <a:cs typeface="Calibri"/>
+              </a:rPr>
+              <a:t>More animation for a game-like experience </a:t>
             </a:r>
             <a:endParaRPr lang="zh-TW" altLang="en-US" sz="3600" dirty="0">
               <a:solidFill>
@@ -3377,7 +3476,7 @@
 </p:sld>
 </file>
 
-<file path=ppt/slides/slide2.xml><?xml version="1.0" encoding="utf-8"?>
+<file path=ppt/slides/slide11.xml><?xml version="1.0" encoding="utf-8"?>
 <p:sld xmlns:a="http://schemas.openxmlformats.org/drawingml/2006/main" xmlns:r="http://schemas.openxmlformats.org/officeDocument/2006/relationships" xmlns:p="http://schemas.openxmlformats.org/presentationml/2006/main">
   <p:cSld>
     <p:spTree>
@@ -3396,118 +3495,28 @@
       </p:grpSpPr>
       <p:sp>
         <p:nvSpPr>
-          <p:cNvPr id="3" name="內容版面配置區 2">
-            <a:extLst>
-              <a:ext uri="{FF2B5EF4-FFF2-40B4-BE49-F238E27FC236}">
-                <a16:creationId xmlns:a16="http://schemas.microsoft.com/office/drawing/2014/main" id="{BEAF087F-F803-4FF6-B57A-51CD9027E364}"/>
-              </a:ext>
-            </a:extLst>
-          </p:cNvPr>
+          <p:cNvPr id="2" name="標題 1"/>
           <p:cNvSpPr>
             <a:spLocks noGrp="1"/>
           </p:cNvSpPr>
           <p:nvPr>
-            <p:ph idx="1"/>
+            <p:ph type="ctrTitle"/>
           </p:nvPr>
         </p:nvSpPr>
         <p:spPr>
           <a:xfrm>
-            <a:off x="1672771" y="1607911"/>
-            <a:ext cx="8846458" cy="1143681"/>
-          </a:xfrm>
-        </p:spPr>
-        <p:txBody>
-          <a:bodyPr vert="horz" lIns="91440" tIns="45720" rIns="91440" bIns="45720" rtlCol="0" anchor="t">
-            <a:normAutofit/>
-          </a:bodyPr>
-          <a:lstStyle/>
-          <a:p>
-            <a:pPr marL="0" indent="0" algn="ctr">
-              <a:buNone/>
-            </a:pPr>
-            <a:r>
-              <a:rPr lang="zh-TW" altLang="en-US" sz="3600" dirty="0">
-                <a:solidFill>
-                  <a:srgbClr val="8CE1EB"/>
-                </a:solidFill>
-                <a:ea typeface="新細明體"/>
-                <a:cs typeface="Calibri"/>
-              </a:rPr>
-              <a:t>For potential employers and partners to </a:t>
-            </a:r>
-            <a:r>
-              <a:rPr lang="zh-TW" altLang="en-US" sz="3600">
-                <a:solidFill>
-                  <a:srgbClr val="8CE1EB"/>
-                </a:solidFill>
-                <a:ea typeface="新細明體"/>
-                <a:cs typeface="Calibri"/>
-              </a:rPr>
-              <a:t>know me and want to work/connect </a:t>
-            </a:r>
-            <a:r>
-              <a:rPr lang="zh-TW" altLang="en-US" sz="3600" dirty="0">
-                <a:solidFill>
-                  <a:srgbClr val="8CE1EB"/>
-                </a:solidFill>
-                <a:ea typeface="新細明體"/>
-                <a:cs typeface="Calibri"/>
-              </a:rPr>
-              <a:t>with me. </a:t>
-            </a:r>
-          </a:p>
-        </p:txBody>
-      </p:sp>
-      <p:sp>
-        <p:nvSpPr>
-          <p:cNvPr id="7" name="標題 1">
-            <a:extLst>
-              <a:ext uri="{FF2B5EF4-FFF2-40B4-BE49-F238E27FC236}">
-                <a16:creationId xmlns:a16="http://schemas.microsoft.com/office/drawing/2014/main" id="{EA18594B-857C-48FE-84EC-D3FD37BC169D}"/>
-              </a:ext>
-            </a:extLst>
-          </p:cNvPr>
-          <p:cNvSpPr txBox="1">
-            <a:spLocks/>
-          </p:cNvSpPr>
-          <p:nvPr/>
-        </p:nvSpPr>
-        <p:spPr>
-          <a:xfrm>
-            <a:off x="838200" y="205468"/>
-            <a:ext cx="10515600" cy="1325563"/>
-          </a:xfrm>
-          <a:prstGeom prst="rect">
-            <a:avLst/>
-          </a:prstGeom>
+            <a:off x="1524000" y="4086656"/>
+            <a:ext cx="9144000" cy="1894114"/>
+          </a:xfrm>
         </p:spPr>
         <p:txBody>
           <a:bodyPr vert="horz" lIns="91440" tIns="45720" rIns="91440" bIns="45720" rtlCol="0" anchor="ctr">
             <a:normAutofit/>
           </a:bodyPr>
-          <a:lstStyle>
-            <a:lvl1pPr algn="l" defTabSz="914400" rtl="0" eaLnBrk="1" latinLnBrk="0" hangingPunct="1">
-              <a:lnSpc>
-                <a:spcPct val="90000"/>
-              </a:lnSpc>
-              <a:spcBef>
-                <a:spcPct val="0"/>
-              </a:spcBef>
-              <a:buNone/>
-              <a:defRPr sz="4400" kern="1200">
-                <a:solidFill>
-                  <a:schemeClr val="tx1"/>
-                </a:solidFill>
-                <a:latin typeface="+mj-lt"/>
-                <a:ea typeface="+mj-ea"/>
-                <a:cs typeface="+mj-cs"/>
-              </a:defRPr>
-            </a:lvl1pPr>
-          </a:lstStyle>
-          <a:p>
-            <a:pPr algn="ctr"/>
-            <a:r>
-              <a:rPr lang="zh-TW" altLang="en-US" sz="4800">
+          <a:lstStyle/>
+          <a:p>
+            <a:r>
+              <a:rPr lang="zh-TW" altLang="en-US" sz="4000">
                 <a:solidFill>
                   <a:srgbClr val="8CE1EB"/>
                 </a:solidFill>
@@ -3515,654 +3524,98 @@
                 <a:ea typeface="新細明體"/>
                 <a:cs typeface="Calibri Light"/>
               </a:rPr>
-              <a:t>The Goal</a:t>
-            </a:r>
-          </a:p>
-        </p:txBody>
-      </p:sp>
-      <p:sp>
-        <p:nvSpPr>
-          <p:cNvPr id="8" name="矩形 7">
-            <a:extLst>
-              <a:ext uri="{FF2B5EF4-FFF2-40B4-BE49-F238E27FC236}">
-                <a16:creationId xmlns:a16="http://schemas.microsoft.com/office/drawing/2014/main" id="{C315D3BB-E2CF-4E9C-953B-3D1C2D8CEDBB}"/>
-              </a:ext>
-            </a:extLst>
-          </p:cNvPr>
-          <p:cNvSpPr/>
-          <p:nvPr/>
-        </p:nvSpPr>
-        <p:spPr>
-          <a:xfrm>
-            <a:off x="1008744" y="1607457"/>
-            <a:ext cx="10174512" cy="1059543"/>
-          </a:xfrm>
-          <a:prstGeom prst="rect">
-            <a:avLst/>
-          </a:prstGeom>
-          <a:noFill/>
-          <a:ln w="28575">
-            <a:solidFill>
-              <a:srgbClr val="8CE1EB"/>
-            </a:solidFill>
-          </a:ln>
-        </p:spPr>
-        <p:style>
-          <a:lnRef idx="2">
-            <a:schemeClr val="accent1">
-              <a:shade val="50000"/>
-            </a:schemeClr>
-          </a:lnRef>
-          <a:fillRef idx="1">
-            <a:schemeClr val="accent1"/>
-          </a:fillRef>
-          <a:effectRef idx="0">
-            <a:schemeClr val="accent1"/>
-          </a:effectRef>
-          <a:fontRef idx="minor">
-            <a:schemeClr val="lt1"/>
-          </a:fontRef>
-        </p:style>
-        <p:txBody>
-          <a:bodyPr rtlCol="0" anchor="ctr"/>
-          <a:lstStyle/>
-          <a:p>
-            <a:pPr algn="ctr"/>
-            <a:endParaRPr lang="zh-TW" altLang="en-US"/>
-          </a:p>
-        </p:txBody>
-      </p:sp>
-      <p:sp>
-        <p:nvSpPr>
-          <p:cNvPr id="9" name="矩形 8">
-            <a:extLst>
-              <a:ext uri="{FF2B5EF4-FFF2-40B4-BE49-F238E27FC236}">
-                <a16:creationId xmlns:a16="http://schemas.microsoft.com/office/drawing/2014/main" id="{D2DC56CD-6F84-4FE1-95DA-BD6DC0F308DC}"/>
-              </a:ext>
-            </a:extLst>
-          </p:cNvPr>
-          <p:cNvSpPr/>
-          <p:nvPr/>
-        </p:nvSpPr>
-        <p:spPr>
-          <a:xfrm>
-            <a:off x="1412875" y="2671989"/>
-            <a:ext cx="94343" cy="3490689"/>
-          </a:xfrm>
-          <a:prstGeom prst="rect">
-            <a:avLst/>
-          </a:prstGeom>
-          <a:solidFill>
-            <a:srgbClr val="8CE1EB"/>
-          </a:solidFill>
-          <a:ln>
-            <a:solidFill>
-              <a:srgbClr val="8CE1EB"/>
-            </a:solidFill>
-          </a:ln>
-        </p:spPr>
-        <p:style>
-          <a:lnRef idx="2">
-            <a:schemeClr val="accent1">
-              <a:shade val="50000"/>
-            </a:schemeClr>
-          </a:lnRef>
-          <a:fillRef idx="1">
-            <a:schemeClr val="accent1"/>
-          </a:fillRef>
-          <a:effectRef idx="0">
-            <a:schemeClr val="accent1"/>
-          </a:effectRef>
-          <a:fontRef idx="minor">
-            <a:schemeClr val="lt1"/>
-          </a:fontRef>
-        </p:style>
-        <p:txBody>
-          <a:bodyPr rtlCol="0" anchor="ctr"/>
-          <a:lstStyle/>
-          <a:p>
-            <a:pPr algn="ctr"/>
-            <a:endParaRPr lang="zh-TW" altLang="en-US"/>
-          </a:p>
-        </p:txBody>
-      </p:sp>
-      <p:sp>
-        <p:nvSpPr>
-          <p:cNvPr id="10" name="矩形 9">
-            <a:extLst>
-              <a:ext uri="{FF2B5EF4-FFF2-40B4-BE49-F238E27FC236}">
-                <a16:creationId xmlns:a16="http://schemas.microsoft.com/office/drawing/2014/main" id="{F8494544-8F2A-4DB8-BDD7-649C4984FB57}"/>
-              </a:ext>
-            </a:extLst>
-          </p:cNvPr>
-          <p:cNvSpPr/>
-          <p:nvPr/>
-        </p:nvSpPr>
-        <p:spPr>
-          <a:xfrm>
-            <a:off x="1504950" y="3337379"/>
-            <a:ext cx="914400" cy="94343"/>
-          </a:xfrm>
-          <a:prstGeom prst="rect">
-            <a:avLst/>
-          </a:prstGeom>
-          <a:solidFill>
-            <a:srgbClr val="8CE1EB"/>
-          </a:solidFill>
-          <a:ln>
-            <a:solidFill>
-              <a:srgbClr val="8CE1EB"/>
-            </a:solidFill>
-          </a:ln>
-        </p:spPr>
-        <p:style>
-          <a:lnRef idx="2">
-            <a:schemeClr val="accent1">
-              <a:shade val="50000"/>
-            </a:schemeClr>
-          </a:lnRef>
-          <a:fillRef idx="1">
-            <a:schemeClr val="accent1"/>
-          </a:fillRef>
-          <a:effectRef idx="0">
-            <a:schemeClr val="accent1"/>
-          </a:effectRef>
-          <a:fontRef idx="minor">
-            <a:schemeClr val="lt1"/>
-          </a:fontRef>
-        </p:style>
-        <p:txBody>
-          <a:bodyPr rtlCol="0" anchor="ctr"/>
-          <a:lstStyle/>
-          <a:p>
-            <a:pPr algn="ctr"/>
-            <a:endParaRPr lang="zh-TW" altLang="en-US"/>
-          </a:p>
-        </p:txBody>
-      </p:sp>
-      <p:sp>
-        <p:nvSpPr>
-          <p:cNvPr id="11" name="矩形 10">
-            <a:extLst>
-              <a:ext uri="{FF2B5EF4-FFF2-40B4-BE49-F238E27FC236}">
-                <a16:creationId xmlns:a16="http://schemas.microsoft.com/office/drawing/2014/main" id="{E6E34102-F536-4CD6-8ABF-D266E3A5A135}"/>
-              </a:ext>
-            </a:extLst>
-          </p:cNvPr>
-          <p:cNvSpPr/>
-          <p:nvPr/>
-        </p:nvSpPr>
-        <p:spPr>
-          <a:xfrm>
-            <a:off x="1504949" y="4019550"/>
-            <a:ext cx="914400" cy="94343"/>
-          </a:xfrm>
-          <a:prstGeom prst="rect">
-            <a:avLst/>
-          </a:prstGeom>
-          <a:solidFill>
-            <a:srgbClr val="8CE1EB"/>
-          </a:solidFill>
-          <a:ln>
-            <a:solidFill>
-              <a:srgbClr val="8CE1EB"/>
-            </a:solidFill>
-          </a:ln>
-        </p:spPr>
-        <p:style>
-          <a:lnRef idx="2">
-            <a:schemeClr val="accent1">
-              <a:shade val="50000"/>
-            </a:schemeClr>
-          </a:lnRef>
-          <a:fillRef idx="1">
-            <a:schemeClr val="accent1"/>
-          </a:fillRef>
-          <a:effectRef idx="0">
-            <a:schemeClr val="accent1"/>
-          </a:effectRef>
-          <a:fontRef idx="minor">
-            <a:schemeClr val="lt1"/>
-          </a:fontRef>
-        </p:style>
-        <p:txBody>
-          <a:bodyPr rtlCol="0" anchor="ctr"/>
-          <a:lstStyle/>
-          <a:p>
-            <a:pPr algn="ctr"/>
-            <a:endParaRPr lang="zh-TW" altLang="en-US"/>
-          </a:p>
-        </p:txBody>
-      </p:sp>
-      <p:sp>
-        <p:nvSpPr>
-          <p:cNvPr id="12" name="矩形 11">
-            <a:extLst>
-              <a:ext uri="{FF2B5EF4-FFF2-40B4-BE49-F238E27FC236}">
-                <a16:creationId xmlns:a16="http://schemas.microsoft.com/office/drawing/2014/main" id="{4EF117C5-BC1A-4EF2-BF5C-7238EF52A306}"/>
-              </a:ext>
-            </a:extLst>
-          </p:cNvPr>
-          <p:cNvSpPr/>
-          <p:nvPr/>
-        </p:nvSpPr>
-        <p:spPr>
-          <a:xfrm>
-            <a:off x="1504949" y="4701721"/>
-            <a:ext cx="914400" cy="94343"/>
-          </a:xfrm>
-          <a:prstGeom prst="rect">
-            <a:avLst/>
-          </a:prstGeom>
-          <a:solidFill>
-            <a:srgbClr val="8CE1EB"/>
-          </a:solidFill>
-          <a:ln>
-            <a:solidFill>
-              <a:srgbClr val="8CE1EB"/>
-            </a:solidFill>
-          </a:ln>
-        </p:spPr>
-        <p:style>
-          <a:lnRef idx="2">
-            <a:schemeClr val="accent1">
-              <a:shade val="50000"/>
-            </a:schemeClr>
-          </a:lnRef>
-          <a:fillRef idx="1">
-            <a:schemeClr val="accent1"/>
-          </a:fillRef>
-          <a:effectRef idx="0">
-            <a:schemeClr val="accent1"/>
-          </a:effectRef>
-          <a:fontRef idx="minor">
-            <a:schemeClr val="lt1"/>
-          </a:fontRef>
-        </p:style>
-        <p:txBody>
-          <a:bodyPr rtlCol="0" anchor="ctr"/>
-          <a:lstStyle/>
-          <a:p>
-            <a:pPr algn="ctr"/>
-            <a:endParaRPr lang="zh-TW" altLang="en-US"/>
-          </a:p>
-        </p:txBody>
-      </p:sp>
-      <p:sp>
-        <p:nvSpPr>
-          <p:cNvPr id="13" name="矩形 12">
-            <a:extLst>
-              <a:ext uri="{FF2B5EF4-FFF2-40B4-BE49-F238E27FC236}">
-                <a16:creationId xmlns:a16="http://schemas.microsoft.com/office/drawing/2014/main" id="{D65B72F0-F62F-42E2-8D7F-B2D1E2C00433}"/>
-              </a:ext>
-            </a:extLst>
-          </p:cNvPr>
-          <p:cNvSpPr/>
-          <p:nvPr/>
-        </p:nvSpPr>
-        <p:spPr>
-          <a:xfrm>
-            <a:off x="1504949" y="5383893"/>
-            <a:ext cx="914400" cy="94343"/>
-          </a:xfrm>
-          <a:prstGeom prst="rect">
-            <a:avLst/>
-          </a:prstGeom>
-          <a:solidFill>
-            <a:srgbClr val="8CE1EB"/>
-          </a:solidFill>
-          <a:ln>
-            <a:solidFill>
-              <a:srgbClr val="8CE1EB"/>
-            </a:solidFill>
-          </a:ln>
-        </p:spPr>
-        <p:style>
-          <a:lnRef idx="2">
-            <a:schemeClr val="accent1">
-              <a:shade val="50000"/>
-            </a:schemeClr>
-          </a:lnRef>
-          <a:fillRef idx="1">
-            <a:schemeClr val="accent1"/>
-          </a:fillRef>
-          <a:effectRef idx="0">
-            <a:schemeClr val="accent1"/>
-          </a:effectRef>
-          <a:fontRef idx="minor">
-            <a:schemeClr val="lt1"/>
-          </a:fontRef>
-        </p:style>
-        <p:txBody>
-          <a:bodyPr rtlCol="0" anchor="ctr"/>
-          <a:lstStyle/>
-          <a:p>
-            <a:pPr algn="ctr"/>
-            <a:endParaRPr lang="zh-TW" altLang="en-US"/>
-          </a:p>
-        </p:txBody>
-      </p:sp>
-      <p:sp>
-        <p:nvSpPr>
-          <p:cNvPr id="14" name="矩形 13">
-            <a:extLst>
-              <a:ext uri="{FF2B5EF4-FFF2-40B4-BE49-F238E27FC236}">
-                <a16:creationId xmlns:a16="http://schemas.microsoft.com/office/drawing/2014/main" id="{0681B3CD-6621-4C32-8EFE-DF85772DFF02}"/>
-              </a:ext>
-            </a:extLst>
-          </p:cNvPr>
-          <p:cNvSpPr/>
-          <p:nvPr/>
-        </p:nvSpPr>
-        <p:spPr>
-          <a:xfrm>
-            <a:off x="1504950" y="6066064"/>
-            <a:ext cx="914400" cy="94343"/>
-          </a:xfrm>
-          <a:prstGeom prst="rect">
-            <a:avLst/>
-          </a:prstGeom>
-          <a:solidFill>
-            <a:srgbClr val="8CE1EB"/>
-          </a:solidFill>
-          <a:ln>
-            <a:solidFill>
-              <a:srgbClr val="8CE1EB"/>
-            </a:solidFill>
-          </a:ln>
-        </p:spPr>
-        <p:style>
-          <a:lnRef idx="2">
-            <a:schemeClr val="accent1">
-              <a:shade val="50000"/>
-            </a:schemeClr>
-          </a:lnRef>
-          <a:fillRef idx="1">
-            <a:schemeClr val="accent1"/>
-          </a:fillRef>
-          <a:effectRef idx="0">
-            <a:schemeClr val="accent1"/>
-          </a:effectRef>
-          <a:fontRef idx="minor">
-            <a:schemeClr val="lt1"/>
-          </a:fontRef>
-        </p:style>
-        <p:txBody>
-          <a:bodyPr rtlCol="0" anchor="ctr"/>
-          <a:lstStyle/>
-          <a:p>
-            <a:pPr algn="ctr"/>
-            <a:endParaRPr lang="zh-TW" altLang="en-US"/>
-          </a:p>
-        </p:txBody>
-      </p:sp>
-      <p:sp>
-        <p:nvSpPr>
-          <p:cNvPr id="15" name="文字方塊 14">
-            <a:extLst>
-              <a:ext uri="{FF2B5EF4-FFF2-40B4-BE49-F238E27FC236}">
-                <a16:creationId xmlns:a16="http://schemas.microsoft.com/office/drawing/2014/main" id="{613FCC4D-0EE0-4357-9F26-DA7663A68DEF}"/>
-              </a:ext>
-            </a:extLst>
-          </p:cNvPr>
-          <p:cNvSpPr txBox="1"/>
-          <p:nvPr/>
-        </p:nvSpPr>
-        <p:spPr>
-          <a:xfrm>
-            <a:off x="2417082" y="3041196"/>
-            <a:ext cx="7358742" cy="1077218"/>
-          </a:xfrm>
-          <a:prstGeom prst="rect">
-            <a:avLst/>
-          </a:prstGeom>
-          <a:noFill/>
-        </p:spPr>
-        <p:txBody>
-          <a:bodyPr rot="0" spcFirstLastPara="0" vertOverflow="overflow" horzOverflow="overflow" vert="horz" wrap="square" lIns="91440" tIns="45720" rIns="91440" bIns="45720" numCol="1" spcCol="0" rtlCol="0" fromWordArt="0" anchor="t" anchorCtr="0" forceAA="0" compatLnSpc="1">
-            <a:prstTxWarp prst="textNoShape">
-              <a:avLst/>
-            </a:prstTxWarp>
-            <a:spAutoFit/>
+              <a:t>Thank you</a:t>
+            </a:r>
+            <a:endParaRPr lang="zh-TW" altLang="en-US" sz="4000" dirty="0">
+              <a:solidFill>
+                <a:srgbClr val="8CE1EB"/>
+              </a:solidFill>
+              <a:latin typeface="Verdana"/>
+              <a:ea typeface="新細明體"/>
+              <a:cs typeface="Calibri Light"/>
+            </a:endParaRPr>
+          </a:p>
+        </p:txBody>
+      </p:sp>
+      <p:sp>
+        <p:nvSpPr>
+          <p:cNvPr id="3" name="副標題 2"/>
+          <p:cNvSpPr>
+            <a:spLocks noGrp="1"/>
+          </p:cNvSpPr>
+          <p:nvPr>
+            <p:ph type="subTitle" idx="1"/>
+          </p:nvPr>
+        </p:nvSpPr>
+        <p:spPr>
+          <a:xfrm>
+            <a:off x="9958551" y="5980003"/>
+            <a:ext cx="1813035" cy="775521"/>
+          </a:xfrm>
+        </p:spPr>
+        <p:txBody>
+          <a:bodyPr vert="horz" lIns="91440" tIns="45720" rIns="91440" bIns="45720" rtlCol="0" anchor="t">
+            <a:normAutofit/>
           </a:bodyPr>
           <a:lstStyle/>
           <a:p>
-            <a:r>
-              <a:rPr lang="zh-TW" altLang="en-US" sz="3200">
+            <a:pPr algn="l"/>
+            <a:r>
+              <a:rPr lang="zh-TW" altLang="en-US">
                 <a:solidFill>
-                  <a:srgbClr val="8CE1EB"/>
+                  <a:srgbClr val="222A59"/>
                 </a:solidFill>
                 <a:ea typeface="新細明體"/>
                 <a:cs typeface="Calibri"/>
               </a:rPr>
-              <a:t>Portfolio page to show my previous work</a:t>
-            </a:r>
-          </a:p>
-          <a:p>
-            <a:endParaRPr lang="zh-TW" altLang="en-US" sz="3200" dirty="0">
+              <a:t>By Noe</a:t>
+            </a:r>
+            <a:endParaRPr lang="zh-TW">
+              <a:cs typeface="Calibri" panose="020F0502020204030204"/>
+            </a:endParaRPr>
+          </a:p>
+          <a:p>
+            <a:endParaRPr lang="zh-TW" altLang="en-US" dirty="0">
               <a:ea typeface="新細明體"/>
               <a:cs typeface="Calibri"/>
             </a:endParaRPr>
           </a:p>
         </p:txBody>
       </p:sp>
-      <p:sp>
-        <p:nvSpPr>
-          <p:cNvPr id="17" name="文字方塊 16">
+      <p:pic>
+        <p:nvPicPr>
+          <p:cNvPr id="4" name="圖片 4">
             <a:extLst>
               <a:ext uri="{FF2B5EF4-FFF2-40B4-BE49-F238E27FC236}">
-                <a16:creationId xmlns:a16="http://schemas.microsoft.com/office/drawing/2014/main" id="{02814C8D-55F9-4BE6-9287-E6FD65471940}"/>
+                <a16:creationId xmlns:a16="http://schemas.microsoft.com/office/drawing/2014/main" id="{BFFC6427-B4C3-423A-A90A-52565DFED1A6}"/>
               </a:ext>
             </a:extLst>
           </p:cNvPr>
-          <p:cNvSpPr txBox="1"/>
+          <p:cNvPicPr>
+            <a:picLocks noChangeAspect="1"/>
+          </p:cNvPicPr>
           <p:nvPr/>
-        </p:nvSpPr>
-        <p:spPr>
-          <a:xfrm>
-            <a:off x="2417081" y="3723367"/>
-            <a:ext cx="9593941" cy="1077218"/>
+        </p:nvPicPr>
+        <p:blipFill>
+          <a:blip r:embed="rId2"/>
+          <a:stretch>
+            <a:fillRect/>
+          </a:stretch>
+        </p:blipFill>
+        <p:spPr>
+          <a:xfrm>
+            <a:off x="4136571" y="518511"/>
+            <a:ext cx="3918857" cy="3918857"/>
           </a:xfrm>
           <a:prstGeom prst="rect">
             <a:avLst/>
           </a:prstGeom>
-          <a:noFill/>
-        </p:spPr>
-        <p:txBody>
-          <a:bodyPr rot="0" spcFirstLastPara="0" vertOverflow="overflow" horzOverflow="overflow" vert="horz" wrap="square" lIns="91440" tIns="45720" rIns="91440" bIns="45720" numCol="1" spcCol="0" rtlCol="0" fromWordArt="0" anchor="t" anchorCtr="0" forceAA="0" compatLnSpc="1">
-            <a:prstTxWarp prst="textNoShape">
-              <a:avLst/>
-            </a:prstTxWarp>
-            <a:spAutoFit/>
-          </a:bodyPr>
-          <a:lstStyle/>
-          <a:p>
-            <a:r>
-              <a:rPr lang="zh-TW" altLang="en-US" sz="3200" dirty="0">
-                <a:solidFill>
-                  <a:srgbClr val="8CE1EB"/>
-                </a:solidFill>
-                <a:ea typeface="新細明體"/>
-                <a:cs typeface="Calibri"/>
-              </a:rPr>
-              <a:t>About and Blog page to show my details </a:t>
-            </a:r>
-            <a:r>
-              <a:rPr lang="zh-TW" altLang="en-US" sz="3200">
-                <a:solidFill>
-                  <a:srgbClr val="8CE1EB"/>
-                </a:solidFill>
-                <a:ea typeface="新細明體"/>
-                <a:cs typeface="Calibri"/>
-              </a:rPr>
-              <a:t>and interests</a:t>
-            </a:r>
-          </a:p>
-          <a:p>
-            <a:endParaRPr lang="zh-TW" altLang="en-US" sz="3200" dirty="0">
-              <a:ea typeface="新細明體"/>
-              <a:cs typeface="Calibri"/>
-            </a:endParaRPr>
-          </a:p>
-        </p:txBody>
-      </p:sp>
-      <p:sp>
-        <p:nvSpPr>
-          <p:cNvPr id="18" name="文字方塊 17">
-            <a:extLst>
-              <a:ext uri="{FF2B5EF4-FFF2-40B4-BE49-F238E27FC236}">
-                <a16:creationId xmlns:a16="http://schemas.microsoft.com/office/drawing/2014/main" id="{15E3E4F7-7546-4F6D-BE6F-4B20A18839B4}"/>
-              </a:ext>
-            </a:extLst>
-          </p:cNvPr>
-          <p:cNvSpPr txBox="1"/>
-          <p:nvPr/>
-        </p:nvSpPr>
-        <p:spPr>
-          <a:xfrm>
-            <a:off x="2417081" y="4405538"/>
-            <a:ext cx="7358742" cy="1077218"/>
-          </a:xfrm>
-          <a:prstGeom prst="rect">
-            <a:avLst/>
-          </a:prstGeom>
-          <a:noFill/>
-        </p:spPr>
-        <p:txBody>
-          <a:bodyPr rot="0" spcFirstLastPara="0" vertOverflow="overflow" horzOverflow="overflow" vert="horz" wrap="square" lIns="91440" tIns="45720" rIns="91440" bIns="45720" numCol="1" spcCol="0" rtlCol="0" fromWordArt="0" anchor="t" anchorCtr="0" forceAA="0" compatLnSpc="1">
-            <a:prstTxWarp prst="textNoShape">
-              <a:avLst/>
-            </a:prstTxWarp>
-            <a:spAutoFit/>
-          </a:bodyPr>
-          <a:lstStyle/>
-          <a:p>
-            <a:r>
-              <a:rPr lang="zh-TW" altLang="en-US" sz="3200">
-                <a:solidFill>
-                  <a:srgbClr val="8CE1EB"/>
-                </a:solidFill>
-                <a:ea typeface="新細明體"/>
-                <a:cs typeface="Calibri"/>
-              </a:rPr>
-              <a:t>Contact page for them to email me</a:t>
-            </a:r>
-            <a:endParaRPr lang="zh-TW"/>
-          </a:p>
-          <a:p>
-            <a:endParaRPr lang="zh-TW" altLang="en-US" sz="3200" dirty="0">
-              <a:ea typeface="新細明體"/>
-              <a:cs typeface="Calibri"/>
-            </a:endParaRPr>
-          </a:p>
-        </p:txBody>
-      </p:sp>
-      <p:sp>
-        <p:nvSpPr>
-          <p:cNvPr id="19" name="文字方塊 18">
-            <a:extLst>
-              <a:ext uri="{FF2B5EF4-FFF2-40B4-BE49-F238E27FC236}">
-                <a16:creationId xmlns:a16="http://schemas.microsoft.com/office/drawing/2014/main" id="{79F2FACD-ED9F-4B74-AC66-970B82B1C815}"/>
-              </a:ext>
-            </a:extLst>
-          </p:cNvPr>
-          <p:cNvSpPr txBox="1"/>
-          <p:nvPr/>
-        </p:nvSpPr>
-        <p:spPr>
-          <a:xfrm>
-            <a:off x="2417080" y="5087709"/>
-            <a:ext cx="7358742" cy="1077218"/>
-          </a:xfrm>
-          <a:prstGeom prst="rect">
-            <a:avLst/>
-          </a:prstGeom>
-          <a:noFill/>
-        </p:spPr>
-        <p:txBody>
-          <a:bodyPr rot="0" spcFirstLastPara="0" vertOverflow="overflow" horzOverflow="overflow" vert="horz" wrap="square" lIns="91440" tIns="45720" rIns="91440" bIns="45720" numCol="1" spcCol="0" rtlCol="0" fromWordArt="0" anchor="t" anchorCtr="0" forceAA="0" compatLnSpc="1">
-            <a:prstTxWarp prst="textNoShape">
-              <a:avLst/>
-            </a:prstTxWarp>
-            <a:spAutoFit/>
-          </a:bodyPr>
-          <a:lstStyle/>
-          <a:p>
-            <a:r>
-              <a:rPr lang="zh-TW" altLang="en-US" sz="3200">
-                <a:solidFill>
-                  <a:srgbClr val="8CE1EB"/>
-                </a:solidFill>
-                <a:ea typeface="新細明體"/>
-                <a:cs typeface="Calibri"/>
-              </a:rPr>
-              <a:t>Links to my social media</a:t>
-            </a:r>
-            <a:endParaRPr lang="zh-TW"/>
-          </a:p>
-          <a:p>
-            <a:endParaRPr lang="zh-TW" altLang="en-US" sz="3200" dirty="0">
-              <a:ea typeface="新細明體"/>
-              <a:cs typeface="Calibri"/>
-            </a:endParaRPr>
-          </a:p>
-        </p:txBody>
-      </p:sp>
-      <p:sp>
-        <p:nvSpPr>
-          <p:cNvPr id="20" name="文字方塊 19">
-            <a:extLst>
-              <a:ext uri="{FF2B5EF4-FFF2-40B4-BE49-F238E27FC236}">
-                <a16:creationId xmlns:a16="http://schemas.microsoft.com/office/drawing/2014/main" id="{DFB20696-E0D1-4247-9C73-85A2446BC3E0}"/>
-              </a:ext>
-            </a:extLst>
-          </p:cNvPr>
-          <p:cNvSpPr txBox="1"/>
-          <p:nvPr/>
-        </p:nvSpPr>
-        <p:spPr>
-          <a:xfrm>
-            <a:off x="2417079" y="5784394"/>
-            <a:ext cx="7358742" cy="1077218"/>
-          </a:xfrm>
-          <a:prstGeom prst="rect">
-            <a:avLst/>
-          </a:prstGeom>
-          <a:noFill/>
-        </p:spPr>
-        <p:txBody>
-          <a:bodyPr rot="0" spcFirstLastPara="0" vertOverflow="overflow" horzOverflow="overflow" vert="horz" wrap="square" lIns="91440" tIns="45720" rIns="91440" bIns="45720" numCol="1" spcCol="0" rtlCol="0" fromWordArt="0" anchor="t" anchorCtr="0" forceAA="0" compatLnSpc="1">
-            <a:prstTxWarp prst="textNoShape">
-              <a:avLst/>
-            </a:prstTxWarp>
-            <a:spAutoFit/>
-          </a:bodyPr>
-          <a:lstStyle/>
-          <a:p>
-            <a:r>
-              <a:rPr lang="zh-TW" altLang="en-US" sz="3200">
-                <a:solidFill>
-                  <a:srgbClr val="8CE1EB"/>
-                </a:solidFill>
-                <a:ea typeface="新細明體"/>
-                <a:cs typeface="Calibri"/>
-              </a:rPr>
-              <a:t>Link to download my resume</a:t>
-            </a:r>
-            <a:endParaRPr lang="zh-TW"/>
-          </a:p>
-          <a:p>
-            <a:endParaRPr lang="zh-TW" altLang="en-US" sz="3200" dirty="0">
-              <a:ea typeface="新細明體"/>
-              <a:cs typeface="Calibri"/>
-            </a:endParaRPr>
-          </a:p>
-        </p:txBody>
-      </p:sp>
+        </p:spPr>
+      </p:pic>
     </p:spTree>
     <p:extLst>
       <p:ext uri="{BB962C8B-B14F-4D97-AF65-F5344CB8AC3E}">
-        <p14:creationId xmlns:p14="http://schemas.microsoft.com/office/powerpoint/2010/main" val="3678004103"/>
+        <p14:creationId xmlns:p14="http://schemas.microsoft.com/office/powerpoint/2010/main" val="2945230120"/>
       </p:ext>
     </p:extLst>
   </p:cSld>
@@ -4172,7 +3625,7 @@
 </p:sld>
 </file>
 
-<file path=ppt/slides/slide3.xml><?xml version="1.0" encoding="utf-8"?>
+<file path=ppt/slides/slide2.xml><?xml version="1.0" encoding="utf-8"?>
 <p:sld xmlns:a="http://schemas.openxmlformats.org/drawingml/2006/main" xmlns:r="http://schemas.openxmlformats.org/officeDocument/2006/relationships" xmlns:p="http://schemas.openxmlformats.org/presentationml/2006/main">
   <p:cSld>
     <p:spTree>
@@ -5524,1301 +4977,7 @@
 </p:sld>
 </file>
 
-<file path=ppt/slides/slide4.xml><?xml version="1.0" encoding="utf-8"?>
-<p:sld xmlns:a="http://schemas.openxmlformats.org/drawingml/2006/main" xmlns:r="http://schemas.openxmlformats.org/officeDocument/2006/relationships" xmlns:p="http://schemas.openxmlformats.org/presentationml/2006/main">
-  <p:cSld>
-    <p:spTree>
-      <p:nvGrpSpPr>
-        <p:cNvPr id="1" name=""/>
-        <p:cNvGrpSpPr/>
-        <p:nvPr/>
-      </p:nvGrpSpPr>
-      <p:grpSpPr>
-        <a:xfrm>
-          <a:off x="0" y="0"/>
-          <a:ext cx="0" cy="0"/>
-          <a:chOff x="0" y="0"/>
-          <a:chExt cx="0" cy="0"/>
-        </a:xfrm>
-      </p:grpSpPr>
-      <p:sp>
-        <p:nvSpPr>
-          <p:cNvPr id="2" name="標題 1">
-            <a:extLst>
-              <a:ext uri="{FF2B5EF4-FFF2-40B4-BE49-F238E27FC236}">
-                <a16:creationId xmlns:a16="http://schemas.microsoft.com/office/drawing/2014/main" id="{521FF66F-721D-4C58-AE64-FFE545614FD9}"/>
-              </a:ext>
-            </a:extLst>
-          </p:cNvPr>
-          <p:cNvSpPr>
-            <a:spLocks noGrp="1"/>
-          </p:cNvSpPr>
-          <p:nvPr>
-            <p:ph type="title"/>
-          </p:nvPr>
-        </p:nvSpPr>
-        <p:spPr>
-          <a:xfrm>
-            <a:off x="504372" y="205468"/>
-            <a:ext cx="11183256" cy="1325563"/>
-          </a:xfrm>
-        </p:spPr>
-        <p:txBody>
-          <a:bodyPr>
-            <a:normAutofit/>
-          </a:bodyPr>
-          <a:lstStyle/>
-          <a:p>
-            <a:pPr algn="ctr"/>
-            <a:r>
-              <a:rPr lang="zh-TW" altLang="en-US" sz="4800">
-                <a:solidFill>
-                  <a:srgbClr val="8CE1EB"/>
-                </a:solidFill>
-                <a:latin typeface="Verdana"/>
-                <a:ea typeface="新細明體"/>
-                <a:cs typeface="Calibri Light"/>
-              </a:rPr>
-              <a:t>Wireframes @ 1024px or higher</a:t>
-            </a:r>
-          </a:p>
-        </p:txBody>
-      </p:sp>
-      <p:pic>
-        <p:nvPicPr>
-          <p:cNvPr id="6" name="圖片 8" descr="一張含有 文字, 電子用品, 螢幕擷取畫面, 向量圖形 的圖片&#10;&#10;自動產生的描述">
-            <a:extLst>
-              <a:ext uri="{FF2B5EF4-FFF2-40B4-BE49-F238E27FC236}">
-                <a16:creationId xmlns:a16="http://schemas.microsoft.com/office/drawing/2014/main" id="{693380DF-D9E2-44A7-AF43-38582A636E12}"/>
-              </a:ext>
-            </a:extLst>
-          </p:cNvPr>
-          <p:cNvPicPr>
-            <a:picLocks noChangeAspect="1"/>
-          </p:cNvPicPr>
-          <p:nvPr/>
-        </p:nvPicPr>
-        <p:blipFill>
-          <a:blip r:embed="rId2"/>
-          <a:stretch>
-            <a:fillRect/>
-          </a:stretch>
-        </p:blipFill>
-        <p:spPr>
-          <a:xfrm>
-            <a:off x="4455886" y="2191058"/>
-            <a:ext cx="6959599" cy="4362742"/>
-          </a:xfrm>
-          <a:prstGeom prst="rect">
-            <a:avLst/>
-          </a:prstGeom>
-          <a:ln w="28575">
-            <a:solidFill>
-              <a:srgbClr val="8CE1EB"/>
-            </a:solidFill>
-          </a:ln>
-        </p:spPr>
-      </p:pic>
-      <p:sp>
-        <p:nvSpPr>
-          <p:cNvPr id="9" name="文字方塊 8">
-            <a:extLst>
-              <a:ext uri="{FF2B5EF4-FFF2-40B4-BE49-F238E27FC236}">
-                <a16:creationId xmlns:a16="http://schemas.microsoft.com/office/drawing/2014/main" id="{098346FA-CF50-4BAE-8AE7-0550EA8340B7}"/>
-              </a:ext>
-            </a:extLst>
-          </p:cNvPr>
-          <p:cNvSpPr txBox="1"/>
-          <p:nvPr/>
-        </p:nvSpPr>
-        <p:spPr>
-          <a:xfrm>
-            <a:off x="7119257" y="1357086"/>
-            <a:ext cx="1640114" cy="707886"/>
-          </a:xfrm>
-          <a:prstGeom prst="rect">
-            <a:avLst/>
-          </a:prstGeom>
-          <a:noFill/>
-        </p:spPr>
-        <p:txBody>
-          <a:bodyPr rot="0" spcFirstLastPara="0" vertOverflow="overflow" horzOverflow="overflow" vert="horz" wrap="square" lIns="91440" tIns="45720" rIns="91440" bIns="45720" numCol="1" spcCol="0" rtlCol="0" fromWordArt="0" anchor="t" anchorCtr="0" forceAA="0" compatLnSpc="1">
-            <a:prstTxWarp prst="textNoShape">
-              <a:avLst/>
-            </a:prstTxWarp>
-            <a:spAutoFit/>
-          </a:bodyPr>
-          <a:lstStyle/>
-          <a:p>
-            <a:pPr algn="l"/>
-            <a:r>
-              <a:rPr lang="zh-TW" altLang="en-US" sz="4000">
-                <a:solidFill>
-                  <a:srgbClr val="8CE1EB"/>
-                </a:solidFill>
-                <a:ea typeface="新細明體"/>
-              </a:rPr>
-              <a:t>Home</a:t>
-            </a:r>
-            <a:endParaRPr lang="zh-TW" altLang="en-US" sz="4000">
-              <a:solidFill>
-                <a:srgbClr val="8CE1EB"/>
-              </a:solidFill>
-            </a:endParaRPr>
-          </a:p>
-        </p:txBody>
-      </p:sp>
-      <p:pic>
-        <p:nvPicPr>
-          <p:cNvPr id="13" name="圖片 13" descr="一張含有 文字, 螢幕擷取畫面, 電子用品 的圖片&#10;&#10;自動產生的描述">
-            <a:extLst>
-              <a:ext uri="{FF2B5EF4-FFF2-40B4-BE49-F238E27FC236}">
-                <a16:creationId xmlns:a16="http://schemas.microsoft.com/office/drawing/2014/main" id="{07A343A1-50E4-49F4-A93A-752AC7EF879F}"/>
-              </a:ext>
-            </a:extLst>
-          </p:cNvPr>
-          <p:cNvPicPr>
-            <a:picLocks noChangeAspect="1"/>
-          </p:cNvPicPr>
-          <p:nvPr/>
-        </p:nvPicPr>
-        <p:blipFill>
-          <a:blip r:embed="rId3"/>
-          <a:stretch>
-            <a:fillRect/>
-          </a:stretch>
-        </p:blipFill>
-        <p:spPr>
-          <a:xfrm>
-            <a:off x="8338457" y="4180725"/>
-            <a:ext cx="3505200" cy="2096093"/>
-          </a:xfrm>
-          <a:prstGeom prst="rect">
-            <a:avLst/>
-          </a:prstGeom>
-        </p:spPr>
-      </p:pic>
-      <p:pic>
-        <p:nvPicPr>
-          <p:cNvPr id="14" name="圖片 22">
-            <a:extLst>
-              <a:ext uri="{FF2B5EF4-FFF2-40B4-BE49-F238E27FC236}">
-                <a16:creationId xmlns:a16="http://schemas.microsoft.com/office/drawing/2014/main" id="{E065BF51-8A63-437E-83A3-90028097227F}"/>
-              </a:ext>
-            </a:extLst>
-          </p:cNvPr>
-          <p:cNvPicPr>
-            <a:picLocks noChangeAspect="1"/>
-          </p:cNvPicPr>
-          <p:nvPr/>
-        </p:nvPicPr>
-        <p:blipFill>
-          <a:blip r:embed="rId4"/>
-          <a:stretch>
-            <a:fillRect/>
-          </a:stretch>
-        </p:blipFill>
-        <p:spPr>
-          <a:xfrm>
-            <a:off x="413657" y="2472320"/>
-            <a:ext cx="6103257" cy="3800215"/>
-          </a:xfrm>
-          <a:prstGeom prst="rect">
-            <a:avLst/>
-          </a:prstGeom>
-          <a:ln w="28575">
-            <a:solidFill>
-              <a:srgbClr val="8CE1EB"/>
-            </a:solidFill>
-          </a:ln>
-        </p:spPr>
-      </p:pic>
-      <p:sp>
-        <p:nvSpPr>
-          <p:cNvPr id="36" name="文字方塊 35">
-            <a:extLst>
-              <a:ext uri="{FF2B5EF4-FFF2-40B4-BE49-F238E27FC236}">
-                <a16:creationId xmlns:a16="http://schemas.microsoft.com/office/drawing/2014/main" id="{31E823DF-A23B-4E12-9F67-5C5C91A81423}"/>
-              </a:ext>
-            </a:extLst>
-          </p:cNvPr>
-          <p:cNvSpPr txBox="1"/>
-          <p:nvPr/>
-        </p:nvSpPr>
-        <p:spPr>
-          <a:xfrm>
-            <a:off x="2561770" y="1357085"/>
-            <a:ext cx="1807028" cy="707886"/>
-          </a:xfrm>
-          <a:prstGeom prst="rect">
-            <a:avLst/>
-          </a:prstGeom>
-          <a:noFill/>
-        </p:spPr>
-        <p:txBody>
-          <a:bodyPr rot="0" spcFirstLastPara="0" vertOverflow="overflow" horzOverflow="overflow" vert="horz" wrap="square" lIns="91440" tIns="45720" rIns="91440" bIns="45720" numCol="1" spcCol="0" rtlCol="0" fromWordArt="0" anchor="t" anchorCtr="0" forceAA="0" compatLnSpc="1">
-            <a:prstTxWarp prst="textNoShape">
-              <a:avLst/>
-            </a:prstTxWarp>
-            <a:spAutoFit/>
-          </a:bodyPr>
-          <a:lstStyle/>
-          <a:p>
-            <a:pPr algn="l"/>
-            <a:r>
-              <a:rPr lang="zh-TW" altLang="en-US" sz="4000">
-                <a:solidFill>
-                  <a:srgbClr val="8CE1EB"/>
-                </a:solidFill>
-                <a:ea typeface="新細明體"/>
-              </a:rPr>
-              <a:t>Contact</a:t>
-            </a:r>
-            <a:endParaRPr lang="zh-TW" altLang="en-US" sz="4000">
-              <a:solidFill>
-                <a:srgbClr val="8CE1EB"/>
-              </a:solidFill>
-            </a:endParaRPr>
-          </a:p>
-        </p:txBody>
-      </p:sp>
-      <p:sp>
-        <p:nvSpPr>
-          <p:cNvPr id="37" name="文字方塊 36">
-            <a:extLst>
-              <a:ext uri="{FF2B5EF4-FFF2-40B4-BE49-F238E27FC236}">
-                <a16:creationId xmlns:a16="http://schemas.microsoft.com/office/drawing/2014/main" id="{590A0D54-776E-4513-A4BE-3E3F090D46CC}"/>
-              </a:ext>
-            </a:extLst>
-          </p:cNvPr>
-          <p:cNvSpPr txBox="1"/>
-          <p:nvPr/>
-        </p:nvSpPr>
-        <p:spPr>
-          <a:xfrm>
-            <a:off x="9274628" y="1357085"/>
-            <a:ext cx="1640114" cy="707886"/>
-          </a:xfrm>
-          <a:prstGeom prst="rect">
-            <a:avLst/>
-          </a:prstGeom>
-          <a:noFill/>
-        </p:spPr>
-        <p:txBody>
-          <a:bodyPr rot="0" spcFirstLastPara="0" vertOverflow="overflow" horzOverflow="overflow" vert="horz" wrap="square" lIns="91440" tIns="45720" rIns="91440" bIns="45720" numCol="1" spcCol="0" rtlCol="0" fromWordArt="0" anchor="t" anchorCtr="0" forceAA="0" compatLnSpc="1">
-            <a:prstTxWarp prst="textNoShape">
-              <a:avLst/>
-            </a:prstTxWarp>
-            <a:spAutoFit/>
-          </a:bodyPr>
-          <a:lstStyle/>
-          <a:p>
-            <a:pPr algn="l"/>
-            <a:r>
-              <a:rPr lang="zh-TW" altLang="en-US" sz="4000">
-                <a:solidFill>
-                  <a:srgbClr val="8CE1EB"/>
-                </a:solidFill>
-                <a:ea typeface="新細明體"/>
-              </a:rPr>
-              <a:t>About</a:t>
-            </a:r>
-            <a:endParaRPr lang="zh-TW" altLang="en-US" sz="4000">
-              <a:solidFill>
-                <a:srgbClr val="8CE1EB"/>
-              </a:solidFill>
-            </a:endParaRPr>
-          </a:p>
-        </p:txBody>
-      </p:sp>
-    </p:spTree>
-    <p:extLst>
-      <p:ext uri="{BB962C8B-B14F-4D97-AF65-F5344CB8AC3E}">
-        <p14:creationId xmlns:p14="http://schemas.microsoft.com/office/powerpoint/2010/main" val="2125693125"/>
-      </p:ext>
-    </p:extLst>
-  </p:cSld>
-  <p:clrMapOvr>
-    <a:masterClrMapping/>
-  </p:clrMapOvr>
-</p:sld>
-</file>
-
-<file path=ppt/slides/slide5.xml><?xml version="1.0" encoding="utf-8"?>
-<p:sld xmlns:a="http://schemas.openxmlformats.org/drawingml/2006/main" xmlns:r="http://schemas.openxmlformats.org/officeDocument/2006/relationships" xmlns:p="http://schemas.openxmlformats.org/presentationml/2006/main">
-  <p:cSld>
-    <p:spTree>
-      <p:nvGrpSpPr>
-        <p:cNvPr id="1" name=""/>
-        <p:cNvGrpSpPr/>
-        <p:nvPr/>
-      </p:nvGrpSpPr>
-      <p:grpSpPr>
-        <a:xfrm>
-          <a:off x="0" y="0"/>
-          <a:ext cx="0" cy="0"/>
-          <a:chOff x="0" y="0"/>
-          <a:chExt cx="0" cy="0"/>
-        </a:xfrm>
-      </p:grpSpPr>
-      <p:sp>
-        <p:nvSpPr>
-          <p:cNvPr id="2" name="標題 1">
-            <a:extLst>
-              <a:ext uri="{FF2B5EF4-FFF2-40B4-BE49-F238E27FC236}">
-                <a16:creationId xmlns:a16="http://schemas.microsoft.com/office/drawing/2014/main" id="{521FF66F-721D-4C58-AE64-FFE545614FD9}"/>
-              </a:ext>
-            </a:extLst>
-          </p:cNvPr>
-          <p:cNvSpPr>
-            <a:spLocks noGrp="1"/>
-          </p:cNvSpPr>
-          <p:nvPr>
-            <p:ph type="title"/>
-          </p:nvPr>
-        </p:nvSpPr>
-        <p:spPr>
-          <a:xfrm>
-            <a:off x="504372" y="205468"/>
-            <a:ext cx="11183256" cy="1325563"/>
-          </a:xfrm>
-        </p:spPr>
-        <p:txBody>
-          <a:bodyPr>
-            <a:normAutofit/>
-          </a:bodyPr>
-          <a:lstStyle/>
-          <a:p>
-            <a:pPr algn="ctr"/>
-            <a:r>
-              <a:rPr lang="zh-TW" altLang="en-US" sz="4800">
-                <a:solidFill>
-                  <a:srgbClr val="8CE1EB"/>
-                </a:solidFill>
-                <a:latin typeface="Verdana"/>
-                <a:ea typeface="新細明體"/>
-                <a:cs typeface="Calibri Light"/>
-              </a:rPr>
-              <a:t>Wireframes @ 1024px or higher</a:t>
-            </a:r>
-          </a:p>
-        </p:txBody>
-      </p:sp>
-      <p:pic>
-        <p:nvPicPr>
-          <p:cNvPr id="5" name="圖片 6" descr="一張含有 文字, 螢幕擷取畫面, 電子用品 的圖片&#10;&#10;自動產生的描述">
-            <a:extLst>
-              <a:ext uri="{FF2B5EF4-FFF2-40B4-BE49-F238E27FC236}">
-                <a16:creationId xmlns:a16="http://schemas.microsoft.com/office/drawing/2014/main" id="{1E7B5690-3081-4E4A-BCAD-DF61FBADE105}"/>
-              </a:ext>
-            </a:extLst>
-          </p:cNvPr>
-          <p:cNvPicPr>
-            <a:picLocks noChangeAspect="1"/>
-          </p:cNvPicPr>
-          <p:nvPr/>
-        </p:nvPicPr>
-        <p:blipFill>
-          <a:blip r:embed="rId2"/>
-          <a:stretch>
-            <a:fillRect/>
-          </a:stretch>
-        </p:blipFill>
-        <p:spPr>
-          <a:xfrm>
-            <a:off x="384629" y="2396765"/>
-            <a:ext cx="5486400" cy="3878752"/>
-          </a:xfrm>
-          <a:prstGeom prst="rect">
-            <a:avLst/>
-          </a:prstGeom>
-          <a:ln w="28575">
-            <a:solidFill>
-              <a:srgbClr val="8CE1EB"/>
-            </a:solidFill>
-          </a:ln>
-        </p:spPr>
-      </p:pic>
-      <p:pic>
-        <p:nvPicPr>
-          <p:cNvPr id="7" name="圖片 7" descr="一張含有 文字, 電子用品, 螢幕擷取畫面 的圖片&#10;&#10;自動產生的描述">
-            <a:extLst>
-              <a:ext uri="{FF2B5EF4-FFF2-40B4-BE49-F238E27FC236}">
-                <a16:creationId xmlns:a16="http://schemas.microsoft.com/office/drawing/2014/main" id="{9F36F960-35E3-4D21-9D5C-55927C6B94FE}"/>
-              </a:ext>
-            </a:extLst>
-          </p:cNvPr>
-          <p:cNvPicPr>
-            <a:picLocks noChangeAspect="1"/>
-          </p:cNvPicPr>
-          <p:nvPr/>
-        </p:nvPicPr>
-        <p:blipFill>
-          <a:blip r:embed="rId3"/>
-          <a:stretch>
-            <a:fillRect/>
-          </a:stretch>
-        </p:blipFill>
-        <p:spPr>
-          <a:xfrm>
-            <a:off x="6320971" y="2398119"/>
-            <a:ext cx="5486400" cy="3876046"/>
-          </a:xfrm>
-          <a:prstGeom prst="rect">
-            <a:avLst/>
-          </a:prstGeom>
-          <a:ln w="28575">
-            <a:solidFill>
-              <a:srgbClr val="8CE1EB"/>
-            </a:solidFill>
-          </a:ln>
-        </p:spPr>
-      </p:pic>
-      <p:sp>
-        <p:nvSpPr>
-          <p:cNvPr id="8" name="文字方塊 7">
-            <a:extLst>
-              <a:ext uri="{FF2B5EF4-FFF2-40B4-BE49-F238E27FC236}">
-                <a16:creationId xmlns:a16="http://schemas.microsoft.com/office/drawing/2014/main" id="{2242D533-C4A7-4F8B-A5D0-54FED0C84244}"/>
-              </a:ext>
-            </a:extLst>
-          </p:cNvPr>
-          <p:cNvSpPr txBox="1"/>
-          <p:nvPr/>
-        </p:nvSpPr>
-        <p:spPr>
-          <a:xfrm>
-            <a:off x="2039256" y="1444171"/>
-            <a:ext cx="2184399" cy="707886"/>
-          </a:xfrm>
-          <a:prstGeom prst="rect">
-            <a:avLst/>
-          </a:prstGeom>
-          <a:noFill/>
-        </p:spPr>
-        <p:txBody>
-          <a:bodyPr rot="0" spcFirstLastPara="0" vertOverflow="overflow" horzOverflow="overflow" vert="horz" wrap="square" lIns="91440" tIns="45720" rIns="91440" bIns="45720" numCol="1" spcCol="0" rtlCol="0" fromWordArt="0" anchor="t" anchorCtr="0" forceAA="0" compatLnSpc="1">
-            <a:prstTxWarp prst="textNoShape">
-              <a:avLst/>
-            </a:prstTxWarp>
-            <a:spAutoFit/>
-          </a:bodyPr>
-          <a:lstStyle/>
-          <a:p>
-            <a:pPr algn="l"/>
-            <a:r>
-              <a:rPr lang="zh-TW" altLang="en-US" sz="4000">
-                <a:solidFill>
-                  <a:srgbClr val="8CE1EB"/>
-                </a:solidFill>
-                <a:ea typeface="新細明體"/>
-              </a:rPr>
-              <a:t>Portfolio</a:t>
-            </a:r>
-            <a:endParaRPr lang="zh-TW" altLang="en-US" sz="4000">
-              <a:solidFill>
-                <a:srgbClr val="8CE1EB"/>
-              </a:solidFill>
-            </a:endParaRPr>
-          </a:p>
-        </p:txBody>
-      </p:sp>
-      <p:sp>
-        <p:nvSpPr>
-          <p:cNvPr id="11" name="文字方塊 10">
-            <a:extLst>
-              <a:ext uri="{FF2B5EF4-FFF2-40B4-BE49-F238E27FC236}">
-                <a16:creationId xmlns:a16="http://schemas.microsoft.com/office/drawing/2014/main" id="{02184437-5F47-4999-8152-CCF82A53973F}"/>
-              </a:ext>
-            </a:extLst>
-          </p:cNvPr>
-          <p:cNvSpPr txBox="1"/>
-          <p:nvPr/>
-        </p:nvSpPr>
-        <p:spPr>
-          <a:xfrm>
-            <a:off x="8411027" y="1444170"/>
-            <a:ext cx="1313542" cy="707886"/>
-          </a:xfrm>
-          <a:prstGeom prst="rect">
-            <a:avLst/>
-          </a:prstGeom>
-          <a:noFill/>
-        </p:spPr>
-        <p:txBody>
-          <a:bodyPr rot="0" spcFirstLastPara="0" vertOverflow="overflow" horzOverflow="overflow" vert="horz" wrap="square" lIns="91440" tIns="45720" rIns="91440" bIns="45720" numCol="1" spcCol="0" rtlCol="0" fromWordArt="0" anchor="t" anchorCtr="0" forceAA="0" compatLnSpc="1">
-            <a:prstTxWarp prst="textNoShape">
-              <a:avLst/>
-            </a:prstTxWarp>
-            <a:spAutoFit/>
-          </a:bodyPr>
-          <a:lstStyle/>
-          <a:p>
-            <a:pPr algn="l"/>
-            <a:r>
-              <a:rPr lang="zh-TW" altLang="en-US" sz="4000">
-                <a:solidFill>
-                  <a:srgbClr val="8CE1EB"/>
-                </a:solidFill>
-                <a:ea typeface="新細明體"/>
-              </a:rPr>
-              <a:t>Blog</a:t>
-            </a:r>
-            <a:endParaRPr lang="zh-TW" altLang="en-US" sz="4000">
-              <a:solidFill>
-                <a:srgbClr val="8CE1EB"/>
-              </a:solidFill>
-            </a:endParaRPr>
-          </a:p>
-        </p:txBody>
-      </p:sp>
-    </p:spTree>
-    <p:extLst>
-      <p:ext uri="{BB962C8B-B14F-4D97-AF65-F5344CB8AC3E}">
-        <p14:creationId xmlns:p14="http://schemas.microsoft.com/office/powerpoint/2010/main" val="3987598738"/>
-      </p:ext>
-    </p:extLst>
-  </p:cSld>
-  <p:clrMapOvr>
-    <a:masterClrMapping/>
-  </p:clrMapOvr>
-</p:sld>
-</file>
-
-<file path=ppt/slides/slide6.xml><?xml version="1.0" encoding="utf-8"?>
-<p:sld xmlns:a="http://schemas.openxmlformats.org/drawingml/2006/main" xmlns:r="http://schemas.openxmlformats.org/officeDocument/2006/relationships" xmlns:p="http://schemas.openxmlformats.org/presentationml/2006/main">
-  <p:cSld>
-    <p:spTree>
-      <p:nvGrpSpPr>
-        <p:cNvPr id="1" name=""/>
-        <p:cNvGrpSpPr/>
-        <p:nvPr/>
-      </p:nvGrpSpPr>
-      <p:grpSpPr>
-        <a:xfrm>
-          <a:off x="0" y="0"/>
-          <a:ext cx="0" cy="0"/>
-          <a:chOff x="0" y="0"/>
-          <a:chExt cx="0" cy="0"/>
-        </a:xfrm>
-      </p:grpSpPr>
-      <p:sp>
-        <p:nvSpPr>
-          <p:cNvPr id="2" name="標題 1">
-            <a:extLst>
-              <a:ext uri="{FF2B5EF4-FFF2-40B4-BE49-F238E27FC236}">
-                <a16:creationId xmlns:a16="http://schemas.microsoft.com/office/drawing/2014/main" id="{521FF66F-721D-4C58-AE64-FFE545614FD9}"/>
-              </a:ext>
-            </a:extLst>
-          </p:cNvPr>
-          <p:cNvSpPr>
-            <a:spLocks noGrp="1"/>
-          </p:cNvSpPr>
-          <p:nvPr>
-            <p:ph type="title"/>
-          </p:nvPr>
-        </p:nvSpPr>
-        <p:spPr>
-          <a:xfrm>
-            <a:off x="504372" y="205468"/>
-            <a:ext cx="11183256" cy="1325563"/>
-          </a:xfrm>
-        </p:spPr>
-        <p:txBody>
-          <a:bodyPr>
-            <a:normAutofit/>
-          </a:bodyPr>
-          <a:lstStyle/>
-          <a:p>
-            <a:pPr algn="ctr"/>
-            <a:r>
-              <a:rPr lang="zh-TW" altLang="en-US" sz="4800">
-                <a:solidFill>
-                  <a:srgbClr val="8CE1EB"/>
-                </a:solidFill>
-                <a:latin typeface="Verdana"/>
-                <a:ea typeface="新細明體"/>
-                <a:cs typeface="Calibri Light"/>
-              </a:rPr>
-              <a:t>Wireframes @ lower than 1024px</a:t>
-            </a:r>
-          </a:p>
-        </p:txBody>
-      </p:sp>
-      <p:sp>
-        <p:nvSpPr>
-          <p:cNvPr id="8" name="文字方塊 7">
-            <a:extLst>
-              <a:ext uri="{FF2B5EF4-FFF2-40B4-BE49-F238E27FC236}">
-                <a16:creationId xmlns:a16="http://schemas.microsoft.com/office/drawing/2014/main" id="{2242D533-C4A7-4F8B-A5D0-54FED0C84244}"/>
-              </a:ext>
-            </a:extLst>
-          </p:cNvPr>
-          <p:cNvSpPr txBox="1"/>
-          <p:nvPr/>
-        </p:nvSpPr>
-        <p:spPr>
-          <a:xfrm>
-            <a:off x="740227" y="1444171"/>
-            <a:ext cx="2184399" cy="707886"/>
-          </a:xfrm>
-          <a:prstGeom prst="rect">
-            <a:avLst/>
-          </a:prstGeom>
-          <a:noFill/>
-        </p:spPr>
-        <p:txBody>
-          <a:bodyPr rot="0" spcFirstLastPara="0" vertOverflow="overflow" horzOverflow="overflow" vert="horz" wrap="square" lIns="91440" tIns="45720" rIns="91440" bIns="45720" numCol="1" spcCol="0" rtlCol="0" fromWordArt="0" anchor="t" anchorCtr="0" forceAA="0" compatLnSpc="1">
-            <a:prstTxWarp prst="textNoShape">
-              <a:avLst/>
-            </a:prstTxWarp>
-            <a:spAutoFit/>
-          </a:bodyPr>
-          <a:lstStyle/>
-          <a:p>
-            <a:pPr algn="l"/>
-            <a:r>
-              <a:rPr lang="zh-TW" altLang="en-US" sz="4000">
-                <a:solidFill>
-                  <a:srgbClr val="8CE1EB"/>
-                </a:solidFill>
-                <a:ea typeface="新細明體"/>
-              </a:rPr>
-              <a:t>Contact</a:t>
-            </a:r>
-            <a:endParaRPr lang="zh-TW" altLang="en-US" sz="4000">
-              <a:solidFill>
-                <a:srgbClr val="8CE1EB"/>
-              </a:solidFill>
-            </a:endParaRPr>
-          </a:p>
-        </p:txBody>
-      </p:sp>
-      <p:sp>
-        <p:nvSpPr>
-          <p:cNvPr id="11" name="文字方塊 10">
-            <a:extLst>
-              <a:ext uri="{FF2B5EF4-FFF2-40B4-BE49-F238E27FC236}">
-                <a16:creationId xmlns:a16="http://schemas.microsoft.com/office/drawing/2014/main" id="{02184437-5F47-4999-8152-CCF82A53973F}"/>
-              </a:ext>
-            </a:extLst>
-          </p:cNvPr>
-          <p:cNvSpPr txBox="1"/>
-          <p:nvPr/>
-        </p:nvSpPr>
-        <p:spPr>
-          <a:xfrm>
-            <a:off x="5464627" y="1444170"/>
-            <a:ext cx="1473199" cy="707886"/>
-          </a:xfrm>
-          <a:prstGeom prst="rect">
-            <a:avLst/>
-          </a:prstGeom>
-          <a:noFill/>
-        </p:spPr>
-        <p:txBody>
-          <a:bodyPr rot="0" spcFirstLastPara="0" vertOverflow="overflow" horzOverflow="overflow" vert="horz" wrap="square" lIns="91440" tIns="45720" rIns="91440" bIns="45720" numCol="1" spcCol="0" rtlCol="0" fromWordArt="0" anchor="t" anchorCtr="0" forceAA="0" compatLnSpc="1">
-            <a:prstTxWarp prst="textNoShape">
-              <a:avLst/>
-            </a:prstTxWarp>
-            <a:spAutoFit/>
-          </a:bodyPr>
-          <a:lstStyle/>
-          <a:p>
-            <a:pPr algn="l"/>
-            <a:r>
-              <a:rPr lang="zh-TW" altLang="en-US" sz="4000">
-                <a:solidFill>
-                  <a:srgbClr val="8CE1EB"/>
-                </a:solidFill>
-                <a:ea typeface="新細明體"/>
-                <a:cs typeface="Calibri" panose="020F0502020204030204"/>
-              </a:rPr>
-              <a:t>Home</a:t>
-            </a:r>
-          </a:p>
-        </p:txBody>
-      </p:sp>
-      <p:pic>
-        <p:nvPicPr>
-          <p:cNvPr id="3" name="圖片 3">
-            <a:extLst>
-              <a:ext uri="{FF2B5EF4-FFF2-40B4-BE49-F238E27FC236}">
-                <a16:creationId xmlns:a16="http://schemas.microsoft.com/office/drawing/2014/main" id="{51FF8006-467A-47A8-A6B6-F40C8603EA3B}"/>
-              </a:ext>
-            </a:extLst>
-          </p:cNvPr>
-          <p:cNvPicPr>
-            <a:picLocks noChangeAspect="1"/>
-          </p:cNvPicPr>
-          <p:nvPr/>
-        </p:nvPicPr>
-        <p:blipFill>
-          <a:blip r:embed="rId2"/>
-          <a:stretch>
-            <a:fillRect/>
-          </a:stretch>
-        </p:blipFill>
-        <p:spPr>
-          <a:xfrm>
-            <a:off x="457200" y="2508178"/>
-            <a:ext cx="2743200" cy="3917187"/>
-          </a:xfrm>
-          <a:prstGeom prst="rect">
-            <a:avLst/>
-          </a:prstGeom>
-          <a:ln w="28575">
-            <a:solidFill>
-              <a:srgbClr val="8CE1EB"/>
-            </a:solidFill>
-          </a:ln>
-        </p:spPr>
-      </p:pic>
-      <p:pic>
-        <p:nvPicPr>
-          <p:cNvPr id="4" name="圖片 5" descr="一張含有 文字 的圖片&#10;&#10;自動產生的描述">
-            <a:extLst>
-              <a:ext uri="{FF2B5EF4-FFF2-40B4-BE49-F238E27FC236}">
-                <a16:creationId xmlns:a16="http://schemas.microsoft.com/office/drawing/2014/main" id="{4C3788FC-4383-400A-8E97-EBAF491EEAF5}"/>
-              </a:ext>
-            </a:extLst>
-          </p:cNvPr>
-          <p:cNvPicPr>
-            <a:picLocks noChangeAspect="1"/>
-          </p:cNvPicPr>
-          <p:nvPr/>
-        </p:nvPicPr>
-        <p:blipFill>
-          <a:blip r:embed="rId3"/>
-          <a:stretch>
-            <a:fillRect/>
-          </a:stretch>
-        </p:blipFill>
-        <p:spPr>
-          <a:xfrm>
-            <a:off x="2927404" y="1799772"/>
-            <a:ext cx="1924850" cy="4114800"/>
-          </a:xfrm>
-          <a:prstGeom prst="rect">
-            <a:avLst/>
-          </a:prstGeom>
-          <a:ln w="28575">
-            <a:solidFill>
-              <a:srgbClr val="8CE1EB"/>
-            </a:solidFill>
-          </a:ln>
-        </p:spPr>
-      </p:pic>
-      <p:pic>
-        <p:nvPicPr>
-          <p:cNvPr id="6" name="圖片 8">
-            <a:extLst>
-              <a:ext uri="{FF2B5EF4-FFF2-40B4-BE49-F238E27FC236}">
-                <a16:creationId xmlns:a16="http://schemas.microsoft.com/office/drawing/2014/main" id="{6A7B043D-1695-44FB-8693-F41E433AB067}"/>
-              </a:ext>
-            </a:extLst>
-          </p:cNvPr>
-          <p:cNvPicPr>
-            <a:picLocks noChangeAspect="1"/>
-          </p:cNvPicPr>
-          <p:nvPr/>
-        </p:nvPicPr>
-        <p:blipFill>
-          <a:blip r:embed="rId4"/>
-          <a:stretch>
-            <a:fillRect/>
-          </a:stretch>
-        </p:blipFill>
-        <p:spPr>
-          <a:xfrm>
-            <a:off x="4826000" y="2892806"/>
-            <a:ext cx="2743200" cy="3641416"/>
-          </a:xfrm>
-          <a:prstGeom prst="rect">
-            <a:avLst/>
-          </a:prstGeom>
-          <a:ln w="28575">
-            <a:solidFill>
-              <a:srgbClr val="8CE1EB"/>
-            </a:solidFill>
-          </a:ln>
-        </p:spPr>
-      </p:pic>
-      <p:pic>
-        <p:nvPicPr>
-          <p:cNvPr id="9" name="圖片 9" descr="一張含有 文字 的圖片&#10;&#10;自動產生的描述">
-            <a:extLst>
-              <a:ext uri="{FF2B5EF4-FFF2-40B4-BE49-F238E27FC236}">
-                <a16:creationId xmlns:a16="http://schemas.microsoft.com/office/drawing/2014/main" id="{FEAFCDCB-DA84-4927-B7DA-03D6815266C4}"/>
-              </a:ext>
-            </a:extLst>
-          </p:cNvPr>
-          <p:cNvPicPr>
-            <a:picLocks noChangeAspect="1"/>
-          </p:cNvPicPr>
-          <p:nvPr/>
-        </p:nvPicPr>
-        <p:blipFill>
-          <a:blip r:embed="rId5"/>
-          <a:stretch>
-            <a:fillRect/>
-          </a:stretch>
-        </p:blipFill>
-        <p:spPr>
-          <a:xfrm>
-            <a:off x="7238146" y="1799771"/>
-            <a:ext cx="1924850" cy="4114800"/>
-          </a:xfrm>
-          <a:prstGeom prst="rect">
-            <a:avLst/>
-          </a:prstGeom>
-          <a:ln w="28575">
-            <a:solidFill>
-              <a:srgbClr val="8CE1EB"/>
-            </a:solidFill>
-          </a:ln>
-        </p:spPr>
-      </p:pic>
-      <p:pic>
-        <p:nvPicPr>
-          <p:cNvPr id="10" name="圖片 11">
-            <a:extLst>
-              <a:ext uri="{FF2B5EF4-FFF2-40B4-BE49-F238E27FC236}">
-                <a16:creationId xmlns:a16="http://schemas.microsoft.com/office/drawing/2014/main" id="{9A4E7BD9-1F52-474E-BAC6-C593AA79B020}"/>
-              </a:ext>
-            </a:extLst>
-          </p:cNvPr>
-          <p:cNvPicPr>
-            <a:picLocks noChangeAspect="1"/>
-          </p:cNvPicPr>
-          <p:nvPr/>
-        </p:nvPicPr>
-        <p:blipFill>
-          <a:blip r:embed="rId6"/>
-          <a:stretch>
-            <a:fillRect/>
-          </a:stretch>
-        </p:blipFill>
-        <p:spPr>
-          <a:xfrm>
-            <a:off x="8200571" y="2631549"/>
-            <a:ext cx="2743200" cy="3641416"/>
-          </a:xfrm>
-          <a:prstGeom prst="rect">
-            <a:avLst/>
-          </a:prstGeom>
-          <a:ln w="28575">
-            <a:solidFill>
-              <a:srgbClr val="8CE1EB"/>
-            </a:solidFill>
-          </a:ln>
-        </p:spPr>
-      </p:pic>
-      <p:pic>
-        <p:nvPicPr>
-          <p:cNvPr id="12" name="圖片 12" descr="一張含有 文字 的圖片&#10;&#10;自動產生的描述">
-            <a:extLst>
-              <a:ext uri="{FF2B5EF4-FFF2-40B4-BE49-F238E27FC236}">
-                <a16:creationId xmlns:a16="http://schemas.microsoft.com/office/drawing/2014/main" id="{E06E5F9A-F49F-47A9-9C65-8499C2F8E121}"/>
-              </a:ext>
-            </a:extLst>
-          </p:cNvPr>
-          <p:cNvPicPr>
-            <a:picLocks noChangeAspect="1"/>
-          </p:cNvPicPr>
-          <p:nvPr/>
-        </p:nvPicPr>
-        <p:blipFill>
-          <a:blip r:embed="rId7"/>
-          <a:stretch>
-            <a:fillRect/>
-          </a:stretch>
-        </p:blipFill>
-        <p:spPr>
-          <a:xfrm>
-            <a:off x="9828946" y="2344057"/>
-            <a:ext cx="1924850" cy="4114800"/>
-          </a:xfrm>
-          <a:prstGeom prst="rect">
-            <a:avLst/>
-          </a:prstGeom>
-          <a:ln w="28575">
-            <a:solidFill>
-              <a:srgbClr val="8CE1EB"/>
-            </a:solidFill>
-          </a:ln>
-        </p:spPr>
-      </p:pic>
-      <p:sp>
-        <p:nvSpPr>
-          <p:cNvPr id="13" name="文字方塊 12">
-            <a:extLst>
-              <a:ext uri="{FF2B5EF4-FFF2-40B4-BE49-F238E27FC236}">
-                <a16:creationId xmlns:a16="http://schemas.microsoft.com/office/drawing/2014/main" id="{AA9DD0A3-973C-4368-AD79-17899CC19143}"/>
-              </a:ext>
-            </a:extLst>
-          </p:cNvPr>
-          <p:cNvSpPr txBox="1"/>
-          <p:nvPr/>
-        </p:nvSpPr>
-        <p:spPr>
-          <a:xfrm>
-            <a:off x="10058398" y="1444169"/>
-            <a:ext cx="1473199" cy="707886"/>
-          </a:xfrm>
-          <a:prstGeom prst="rect">
-            <a:avLst/>
-          </a:prstGeom>
-          <a:noFill/>
-        </p:spPr>
-        <p:txBody>
-          <a:bodyPr rot="0" spcFirstLastPara="0" vertOverflow="overflow" horzOverflow="overflow" vert="horz" wrap="square" lIns="91440" tIns="45720" rIns="91440" bIns="45720" numCol="1" spcCol="0" rtlCol="0" fromWordArt="0" anchor="t" anchorCtr="0" forceAA="0" compatLnSpc="1">
-            <a:prstTxWarp prst="textNoShape">
-              <a:avLst/>
-            </a:prstTxWarp>
-            <a:spAutoFit/>
-          </a:bodyPr>
-          <a:lstStyle/>
-          <a:p>
-            <a:pPr algn="l"/>
-            <a:r>
-              <a:rPr lang="zh-TW" altLang="en-US" sz="4000">
-                <a:solidFill>
-                  <a:srgbClr val="8CE1EB"/>
-                </a:solidFill>
-                <a:ea typeface="新細明體"/>
-                <a:cs typeface="Calibri" panose="020F0502020204030204"/>
-              </a:rPr>
-              <a:t>About</a:t>
-            </a:r>
-          </a:p>
-        </p:txBody>
-      </p:sp>
-    </p:spTree>
-    <p:extLst>
-      <p:ext uri="{BB962C8B-B14F-4D97-AF65-F5344CB8AC3E}">
-        <p14:creationId xmlns:p14="http://schemas.microsoft.com/office/powerpoint/2010/main" val="1373712711"/>
-      </p:ext>
-    </p:extLst>
-  </p:cSld>
-  <p:clrMapOvr>
-    <a:masterClrMapping/>
-  </p:clrMapOvr>
-</p:sld>
-</file>
-
-<file path=ppt/slides/slide7.xml><?xml version="1.0" encoding="utf-8"?>
-<p:sld xmlns:a="http://schemas.openxmlformats.org/drawingml/2006/main" xmlns:r="http://schemas.openxmlformats.org/officeDocument/2006/relationships" xmlns:p="http://schemas.openxmlformats.org/presentationml/2006/main">
-  <p:cSld>
-    <p:spTree>
-      <p:nvGrpSpPr>
-        <p:cNvPr id="1" name=""/>
-        <p:cNvGrpSpPr/>
-        <p:nvPr/>
-      </p:nvGrpSpPr>
-      <p:grpSpPr>
-        <a:xfrm>
-          <a:off x="0" y="0"/>
-          <a:ext cx="0" cy="0"/>
-          <a:chOff x="0" y="0"/>
-          <a:chExt cx="0" cy="0"/>
-        </a:xfrm>
-      </p:grpSpPr>
-      <p:sp>
-        <p:nvSpPr>
-          <p:cNvPr id="2" name="標題 1">
-            <a:extLst>
-              <a:ext uri="{FF2B5EF4-FFF2-40B4-BE49-F238E27FC236}">
-                <a16:creationId xmlns:a16="http://schemas.microsoft.com/office/drawing/2014/main" id="{521FF66F-721D-4C58-AE64-FFE545614FD9}"/>
-              </a:ext>
-            </a:extLst>
-          </p:cNvPr>
-          <p:cNvSpPr>
-            <a:spLocks noGrp="1"/>
-          </p:cNvSpPr>
-          <p:nvPr>
-            <p:ph type="title"/>
-          </p:nvPr>
-        </p:nvSpPr>
-        <p:spPr>
-          <a:xfrm>
-            <a:off x="504372" y="205468"/>
-            <a:ext cx="11183256" cy="1325563"/>
-          </a:xfrm>
-        </p:spPr>
-        <p:txBody>
-          <a:bodyPr>
-            <a:normAutofit/>
-          </a:bodyPr>
-          <a:lstStyle/>
-          <a:p>
-            <a:pPr algn="ctr"/>
-            <a:r>
-              <a:rPr lang="zh-TW" altLang="en-US" sz="4800">
-                <a:solidFill>
-                  <a:srgbClr val="8CE1EB"/>
-                </a:solidFill>
-                <a:latin typeface="Verdana"/>
-                <a:ea typeface="新細明體"/>
-                <a:cs typeface="Calibri Light"/>
-              </a:rPr>
-              <a:t>Wireframes @ lower than 1024px</a:t>
-            </a:r>
-          </a:p>
-        </p:txBody>
-      </p:sp>
-      <p:sp>
-        <p:nvSpPr>
-          <p:cNvPr id="8" name="文字方塊 7">
-            <a:extLst>
-              <a:ext uri="{FF2B5EF4-FFF2-40B4-BE49-F238E27FC236}">
-                <a16:creationId xmlns:a16="http://schemas.microsoft.com/office/drawing/2014/main" id="{2242D533-C4A7-4F8B-A5D0-54FED0C84244}"/>
-              </a:ext>
-            </a:extLst>
-          </p:cNvPr>
-          <p:cNvSpPr txBox="1"/>
-          <p:nvPr/>
-        </p:nvSpPr>
-        <p:spPr>
-          <a:xfrm>
-            <a:off x="950685" y="1444171"/>
-            <a:ext cx="2184399" cy="707886"/>
-          </a:xfrm>
-          <a:prstGeom prst="rect">
-            <a:avLst/>
-          </a:prstGeom>
-          <a:noFill/>
-        </p:spPr>
-        <p:txBody>
-          <a:bodyPr rot="0" spcFirstLastPara="0" vertOverflow="overflow" horzOverflow="overflow" vert="horz" wrap="square" lIns="91440" tIns="45720" rIns="91440" bIns="45720" numCol="1" spcCol="0" rtlCol="0" fromWordArt="0" anchor="t" anchorCtr="0" forceAA="0" compatLnSpc="1">
-            <a:prstTxWarp prst="textNoShape">
-              <a:avLst/>
-            </a:prstTxWarp>
-            <a:spAutoFit/>
-          </a:bodyPr>
-          <a:lstStyle/>
-          <a:p>
-            <a:pPr algn="l"/>
-            <a:r>
-              <a:rPr lang="zh-TW" altLang="en-US" sz="4000">
-                <a:solidFill>
-                  <a:srgbClr val="8CE1EB"/>
-                </a:solidFill>
-                <a:ea typeface="新細明體"/>
-              </a:rPr>
-              <a:t>Portfolio</a:t>
-            </a:r>
-            <a:endParaRPr lang="zh-TW" altLang="en-US" sz="4000">
-              <a:solidFill>
-                <a:srgbClr val="8CE1EB"/>
-              </a:solidFill>
-            </a:endParaRPr>
-          </a:p>
-        </p:txBody>
-      </p:sp>
-      <p:sp>
-        <p:nvSpPr>
-          <p:cNvPr id="11" name="文字方塊 10">
-            <a:extLst>
-              <a:ext uri="{FF2B5EF4-FFF2-40B4-BE49-F238E27FC236}">
-                <a16:creationId xmlns:a16="http://schemas.microsoft.com/office/drawing/2014/main" id="{02184437-5F47-4999-8152-CCF82A53973F}"/>
-              </a:ext>
-            </a:extLst>
-          </p:cNvPr>
-          <p:cNvSpPr txBox="1"/>
-          <p:nvPr/>
-        </p:nvSpPr>
-        <p:spPr>
-          <a:xfrm>
-            <a:off x="9550398" y="1444170"/>
-            <a:ext cx="1313542" cy="707886"/>
-          </a:xfrm>
-          <a:prstGeom prst="rect">
-            <a:avLst/>
-          </a:prstGeom>
-          <a:noFill/>
-        </p:spPr>
-        <p:txBody>
-          <a:bodyPr rot="0" spcFirstLastPara="0" vertOverflow="overflow" horzOverflow="overflow" vert="horz" wrap="square" lIns="91440" tIns="45720" rIns="91440" bIns="45720" numCol="1" spcCol="0" rtlCol="0" fromWordArt="0" anchor="t" anchorCtr="0" forceAA="0" compatLnSpc="1">
-            <a:prstTxWarp prst="textNoShape">
-              <a:avLst/>
-            </a:prstTxWarp>
-            <a:spAutoFit/>
-          </a:bodyPr>
-          <a:lstStyle/>
-          <a:p>
-            <a:pPr algn="l"/>
-            <a:r>
-              <a:rPr lang="zh-TW" altLang="en-US" sz="4000">
-                <a:solidFill>
-                  <a:srgbClr val="8CE1EB"/>
-                </a:solidFill>
-                <a:ea typeface="新細明體"/>
-              </a:rPr>
-              <a:t>Blog</a:t>
-            </a:r>
-            <a:endParaRPr lang="zh-TW" altLang="en-US" sz="4000">
-              <a:solidFill>
-                <a:srgbClr val="8CE1EB"/>
-              </a:solidFill>
-            </a:endParaRPr>
-          </a:p>
-        </p:txBody>
-      </p:sp>
-      <p:pic>
-        <p:nvPicPr>
-          <p:cNvPr id="3" name="圖片 3">
-            <a:extLst>
-              <a:ext uri="{FF2B5EF4-FFF2-40B4-BE49-F238E27FC236}">
-                <a16:creationId xmlns:a16="http://schemas.microsoft.com/office/drawing/2014/main" id="{859E6C09-32EC-4819-858F-C388642621C8}"/>
-              </a:ext>
-            </a:extLst>
-          </p:cNvPr>
-          <p:cNvPicPr>
-            <a:picLocks noChangeAspect="1"/>
-          </p:cNvPicPr>
-          <p:nvPr/>
-        </p:nvPicPr>
-        <p:blipFill>
-          <a:blip r:embed="rId2"/>
-          <a:stretch>
-            <a:fillRect/>
-          </a:stretch>
-        </p:blipFill>
-        <p:spPr>
-          <a:xfrm>
-            <a:off x="667657" y="2392063"/>
-            <a:ext cx="2743200" cy="3641416"/>
-          </a:xfrm>
-          <a:prstGeom prst="rect">
-            <a:avLst/>
-          </a:prstGeom>
-          <a:ln w="28575">
-            <a:solidFill>
-              <a:srgbClr val="8CE1EB"/>
-            </a:solidFill>
-          </a:ln>
-        </p:spPr>
-      </p:pic>
-      <p:pic>
-        <p:nvPicPr>
-          <p:cNvPr id="4" name="圖片 4">
-            <a:extLst>
-              <a:ext uri="{FF2B5EF4-FFF2-40B4-BE49-F238E27FC236}">
-                <a16:creationId xmlns:a16="http://schemas.microsoft.com/office/drawing/2014/main" id="{69848F82-B621-4FDE-B889-6536D7FDFD88}"/>
-              </a:ext>
-            </a:extLst>
-          </p:cNvPr>
-          <p:cNvPicPr>
-            <a:picLocks noChangeAspect="1"/>
-          </p:cNvPicPr>
-          <p:nvPr/>
-        </p:nvPicPr>
-        <p:blipFill>
-          <a:blip r:embed="rId3"/>
-          <a:stretch>
-            <a:fillRect/>
-          </a:stretch>
-        </p:blipFill>
-        <p:spPr>
-          <a:xfrm>
-            <a:off x="3912881" y="2155372"/>
-            <a:ext cx="1913324" cy="4114800"/>
-          </a:xfrm>
-          <a:prstGeom prst="rect">
-            <a:avLst/>
-          </a:prstGeom>
-          <a:ln w="28575">
-            <a:solidFill>
-              <a:srgbClr val="8CE1EB"/>
-            </a:solidFill>
-          </a:ln>
-        </p:spPr>
-      </p:pic>
-      <p:pic>
-        <p:nvPicPr>
-          <p:cNvPr id="5" name="圖片 5">
-            <a:extLst>
-              <a:ext uri="{FF2B5EF4-FFF2-40B4-BE49-F238E27FC236}">
-                <a16:creationId xmlns:a16="http://schemas.microsoft.com/office/drawing/2014/main" id="{8710CE38-9BAF-430B-8B84-F0E7F380F7E2}"/>
-              </a:ext>
-            </a:extLst>
-          </p:cNvPr>
-          <p:cNvPicPr>
-            <a:picLocks noChangeAspect="1"/>
-          </p:cNvPicPr>
-          <p:nvPr/>
-        </p:nvPicPr>
-        <p:blipFill>
-          <a:blip r:embed="rId4"/>
-          <a:stretch>
-            <a:fillRect/>
-          </a:stretch>
-        </p:blipFill>
-        <p:spPr>
-          <a:xfrm>
-            <a:off x="8831942" y="2396109"/>
-            <a:ext cx="2743200" cy="3633324"/>
-          </a:xfrm>
-          <a:prstGeom prst="rect">
-            <a:avLst/>
-          </a:prstGeom>
-          <a:ln w="28575">
-            <a:solidFill>
-              <a:srgbClr val="8CE1EB"/>
-            </a:solidFill>
-          </a:ln>
-        </p:spPr>
-      </p:pic>
-      <p:pic>
-        <p:nvPicPr>
-          <p:cNvPr id="6" name="圖片 6">
-            <a:extLst>
-              <a:ext uri="{FF2B5EF4-FFF2-40B4-BE49-F238E27FC236}">
-                <a16:creationId xmlns:a16="http://schemas.microsoft.com/office/drawing/2014/main" id="{FA372748-4FA0-4C2D-B686-566239BC9CC3}"/>
-              </a:ext>
-            </a:extLst>
-          </p:cNvPr>
-          <p:cNvPicPr>
-            <a:picLocks noChangeAspect="1"/>
-          </p:cNvPicPr>
-          <p:nvPr/>
-        </p:nvPicPr>
-        <p:blipFill>
-          <a:blip r:embed="rId5"/>
-          <a:stretch>
-            <a:fillRect/>
-          </a:stretch>
-        </p:blipFill>
-        <p:spPr>
-          <a:xfrm>
-            <a:off x="6364585" y="2155372"/>
-            <a:ext cx="1930257" cy="4114800"/>
-          </a:xfrm>
-          <a:prstGeom prst="rect">
-            <a:avLst/>
-          </a:prstGeom>
-          <a:ln w="28575">
-            <a:solidFill>
-              <a:srgbClr val="8CE1EB"/>
-            </a:solidFill>
-          </a:ln>
-        </p:spPr>
-      </p:pic>
-    </p:spTree>
-    <p:extLst>
-      <p:ext uri="{BB962C8B-B14F-4D97-AF65-F5344CB8AC3E}">
-        <p14:creationId xmlns:p14="http://schemas.microsoft.com/office/powerpoint/2010/main" val="1328007415"/>
-      </p:ext>
-    </p:extLst>
-  </p:cSld>
-  <p:clrMapOvr>
-    <a:masterClrMapping/>
-  </p:clrMapOvr>
-</p:sld>
-</file>
-
-<file path=ppt/slides/slide8.xml><?xml version="1.0" encoding="utf-8"?>
+<file path=ppt/slides/slide3.xml><?xml version="1.0" encoding="utf-8"?>
 <p:sld xmlns:a="http://schemas.openxmlformats.org/drawingml/2006/main" xmlns:r="http://schemas.openxmlformats.org/officeDocument/2006/relationships" xmlns:p="http://schemas.openxmlformats.org/presentationml/2006/main">
   <p:cSld>
     <p:spTree>
@@ -7325,6 +5484,2050 @@
 </p:sld>
 </file>
 
+<file path=ppt/slides/slide4.xml><?xml version="1.0" encoding="utf-8"?>
+<p:sld xmlns:a="http://schemas.openxmlformats.org/drawingml/2006/main" xmlns:r="http://schemas.openxmlformats.org/officeDocument/2006/relationships" xmlns:p="http://schemas.openxmlformats.org/presentationml/2006/main">
+  <p:cSld>
+    <p:spTree>
+      <p:nvGrpSpPr>
+        <p:cNvPr id="1" name=""/>
+        <p:cNvGrpSpPr/>
+        <p:nvPr/>
+      </p:nvGrpSpPr>
+      <p:grpSpPr>
+        <a:xfrm>
+          <a:off x="0" y="0"/>
+          <a:ext cx="0" cy="0"/>
+          <a:chOff x="0" y="0"/>
+          <a:chExt cx="0" cy="0"/>
+        </a:xfrm>
+      </p:grpSpPr>
+      <p:sp>
+        <p:nvSpPr>
+          <p:cNvPr id="2" name="標題 1">
+            <a:extLst>
+              <a:ext uri="{FF2B5EF4-FFF2-40B4-BE49-F238E27FC236}">
+                <a16:creationId xmlns:a16="http://schemas.microsoft.com/office/drawing/2014/main" id="{521FF66F-721D-4C58-AE64-FFE545614FD9}"/>
+              </a:ext>
+            </a:extLst>
+          </p:cNvPr>
+          <p:cNvSpPr>
+            <a:spLocks noGrp="1"/>
+          </p:cNvSpPr>
+          <p:nvPr>
+            <p:ph type="title"/>
+          </p:nvPr>
+        </p:nvSpPr>
+        <p:spPr>
+          <a:xfrm>
+            <a:off x="838200" y="205468"/>
+            <a:ext cx="10515600" cy="1325563"/>
+          </a:xfrm>
+        </p:spPr>
+        <p:txBody>
+          <a:bodyPr>
+            <a:normAutofit/>
+          </a:bodyPr>
+          <a:lstStyle/>
+          <a:p>
+            <a:pPr algn="ctr"/>
+            <a:r>
+              <a:rPr lang="zh-TW" altLang="en-US" sz="4800">
+                <a:solidFill>
+                  <a:srgbClr val="8CE1EB"/>
+                </a:solidFill>
+                <a:latin typeface="Verdana"/>
+                <a:ea typeface="新細明體"/>
+                <a:cs typeface="Calibri Light"/>
+              </a:rPr>
+              <a:t>Components Used</a:t>
+            </a:r>
+            <a:endParaRPr lang="zh-TW" altLang="en-US" sz="4800" dirty="0">
+              <a:solidFill>
+                <a:srgbClr val="8CE1EB"/>
+              </a:solidFill>
+              <a:latin typeface="Verdana"/>
+              <a:ea typeface="新細明體"/>
+              <a:cs typeface="Calibri Light"/>
+            </a:endParaRPr>
+          </a:p>
+        </p:txBody>
+      </p:sp>
+      <p:pic>
+        <p:nvPicPr>
+          <p:cNvPr id="3" name="圖片 8" descr="一張含有 文字, 儀錶, 停車, 螢幕擷取畫面 的圖片&#10;&#10;自動產生的描述">
+            <a:extLst>
+              <a:ext uri="{FF2B5EF4-FFF2-40B4-BE49-F238E27FC236}">
+                <a16:creationId xmlns:a16="http://schemas.microsoft.com/office/drawing/2014/main" id="{A5C79758-2B6E-4460-8D92-1AF4A16F3F76}"/>
+              </a:ext>
+            </a:extLst>
+          </p:cNvPr>
+          <p:cNvPicPr>
+            <a:picLocks noChangeAspect="1"/>
+          </p:cNvPicPr>
+          <p:nvPr/>
+        </p:nvPicPr>
+        <p:blipFill>
+          <a:blip r:embed="rId2"/>
+          <a:stretch>
+            <a:fillRect/>
+          </a:stretch>
+        </p:blipFill>
+        <p:spPr>
+          <a:xfrm>
+            <a:off x="654467" y="1530105"/>
+            <a:ext cx="2743200" cy="4323587"/>
+          </a:xfrm>
+          <a:prstGeom prst="rect">
+            <a:avLst/>
+          </a:prstGeom>
+          <a:ln w="28575">
+            <a:solidFill>
+              <a:srgbClr val="8CE1EB"/>
+            </a:solidFill>
+          </a:ln>
+        </p:spPr>
+      </p:pic>
+      <p:sp>
+        <p:nvSpPr>
+          <p:cNvPr id="9" name="文字方塊 8">
+            <a:extLst>
+              <a:ext uri="{FF2B5EF4-FFF2-40B4-BE49-F238E27FC236}">
+                <a16:creationId xmlns:a16="http://schemas.microsoft.com/office/drawing/2014/main" id="{B6E82D4F-59EE-4038-A747-4FFF3A29BF29}"/>
+              </a:ext>
+            </a:extLst>
+          </p:cNvPr>
+          <p:cNvSpPr txBox="1"/>
+          <p:nvPr/>
+        </p:nvSpPr>
+        <p:spPr>
+          <a:xfrm>
+            <a:off x="4112532" y="1986189"/>
+            <a:ext cx="6618513" cy="3416320"/>
+          </a:xfrm>
+          <a:prstGeom prst="rect">
+            <a:avLst/>
+          </a:prstGeom>
+          <a:noFill/>
+        </p:spPr>
+        <p:txBody>
+          <a:bodyPr rot="0" spcFirstLastPara="0" vertOverflow="overflow" horzOverflow="overflow" vert="horz" wrap="square" lIns="91440" tIns="45720" rIns="91440" bIns="45720" numCol="1" spcCol="0" rtlCol="0" fromWordArt="0" anchor="t" anchorCtr="0" forceAA="0" compatLnSpc="1">
+            <a:prstTxWarp prst="textNoShape">
+              <a:avLst/>
+            </a:prstTxWarp>
+            <a:spAutoFit/>
+          </a:bodyPr>
+          <a:lstStyle/>
+          <a:p>
+            <a:r>
+              <a:rPr lang="zh-TW" altLang="en-US" sz="3600">
+                <a:solidFill>
+                  <a:srgbClr val="8CE1EB"/>
+                </a:solidFill>
+                <a:ea typeface="新細明體"/>
+                <a:cs typeface="Calibri"/>
+              </a:rPr>
+              <a:t>Shared components:</a:t>
+            </a:r>
+          </a:p>
+          <a:p>
+            <a:pPr marL="571500" indent="-571500">
+              <a:buFont typeface="Arial" panose="020B0604020202020204" pitchFamily="34" charset="0"/>
+              <a:buChar char="•"/>
+            </a:pPr>
+            <a:r>
+              <a:rPr lang="zh-TW" altLang="en-US" sz="3600">
+                <a:solidFill>
+                  <a:srgbClr val="8CE1EB"/>
+                </a:solidFill>
+                <a:ea typeface="新細明體"/>
+                <a:cs typeface="Calibri"/>
+              </a:rPr>
+              <a:t>Header – logo</a:t>
+            </a:r>
+          </a:p>
+          <a:p>
+            <a:pPr marL="571500" indent="-571500">
+              <a:buFont typeface="Arial" panose="020B0604020202020204" pitchFamily="34" charset="0"/>
+              <a:buChar char="•"/>
+            </a:pPr>
+            <a:r>
+              <a:rPr lang="zh-TW" altLang="en-US" sz="3600">
+                <a:solidFill>
+                  <a:srgbClr val="8CE1EB"/>
+                </a:solidFill>
+                <a:ea typeface="新細明體"/>
+                <a:cs typeface="Calibri"/>
+              </a:rPr>
+              <a:t>Nav bar – links to other pages</a:t>
+            </a:r>
+          </a:p>
+          <a:p>
+            <a:pPr marL="571500" indent="-571500">
+              <a:buFont typeface="Arial" panose="020B0604020202020204" pitchFamily="34" charset="0"/>
+              <a:buChar char="•"/>
+            </a:pPr>
+            <a:r>
+              <a:rPr lang="zh-TW" altLang="en-US" sz="3600">
+                <a:solidFill>
+                  <a:srgbClr val="8CE1EB"/>
+                </a:solidFill>
+                <a:ea typeface="新細明體"/>
+                <a:cs typeface="Calibri"/>
+              </a:rPr>
+              <a:t>Page title</a:t>
+            </a:r>
+          </a:p>
+          <a:p>
+            <a:pPr marL="571500" indent="-571500">
+              <a:buFont typeface="Arial" panose="020B0604020202020204" pitchFamily="34" charset="0"/>
+              <a:buChar char="•"/>
+            </a:pPr>
+            <a:r>
+              <a:rPr lang="zh-TW" altLang="en-US" sz="3600">
+                <a:solidFill>
+                  <a:srgbClr val="8CE1EB"/>
+                </a:solidFill>
+                <a:ea typeface="新細明體"/>
+                <a:cs typeface="Calibri"/>
+              </a:rPr>
+              <a:t>Side bar – links to social media</a:t>
+            </a:r>
+          </a:p>
+          <a:p>
+            <a:pPr marL="571500" indent="-571500">
+              <a:buFont typeface="Arial" panose="020B0604020202020204" pitchFamily="34" charset="0"/>
+              <a:buChar char="•"/>
+            </a:pPr>
+            <a:r>
+              <a:rPr lang="zh-TW" altLang="en-US" sz="3600">
+                <a:solidFill>
+                  <a:srgbClr val="8CE1EB"/>
+                </a:solidFill>
+                <a:ea typeface="新細明體"/>
+                <a:cs typeface="Calibri"/>
+              </a:rPr>
+              <a:t>Footer – copy right</a:t>
+            </a:r>
+            <a:endParaRPr lang="zh-TW" altLang="en-US" sz="3600" dirty="0">
+              <a:solidFill>
+                <a:srgbClr val="8CE1EB"/>
+              </a:solidFill>
+              <a:ea typeface="新細明體"/>
+              <a:cs typeface="Calibri"/>
+            </a:endParaRPr>
+          </a:p>
+        </p:txBody>
+      </p:sp>
+    </p:spTree>
+    <p:extLst>
+      <p:ext uri="{BB962C8B-B14F-4D97-AF65-F5344CB8AC3E}">
+        <p14:creationId xmlns:p14="http://schemas.microsoft.com/office/powerpoint/2010/main" val="4246733124"/>
+      </p:ext>
+    </p:extLst>
+  </p:cSld>
+  <p:clrMapOvr>
+    <a:masterClrMapping/>
+  </p:clrMapOvr>
+  <p:timing>
+    <p:tnLst>
+      <p:par>
+        <p:cTn id="1" dur="indefinite" restart="never" nodeType="tmRoot">
+          <p:childTnLst>
+            <p:seq concurrent="1" nextAc="seek">
+              <p:cTn id="2" dur="indefinite" nodeType="mainSeq">
+                <p:childTnLst>
+                  <p:par>
+                    <p:cTn id="3" fill="hold">
+                      <p:stCondLst>
+                        <p:cond delay="indefinite"/>
+                      </p:stCondLst>
+                      <p:childTnLst>
+                        <p:par>
+                          <p:cTn id="4" fill="hold">
+                            <p:stCondLst>
+                              <p:cond delay="0"/>
+                            </p:stCondLst>
+                            <p:childTnLst>
+                              <p:par>
+                                <p:cTn id="5" presetID="1" presetClass="entr" presetSubtype="0" fill="hold" nodeType="clickEffect">
+                                  <p:stCondLst>
+                                    <p:cond delay="0"/>
+                                  </p:stCondLst>
+                                  <p:childTnLst>
+                                    <p:set>
+                                      <p:cBhvr>
+                                        <p:cTn id="6" dur="1" fill="hold">
+                                          <p:stCondLst>
+                                            <p:cond delay="0"/>
+                                          </p:stCondLst>
+                                        </p:cTn>
+                                        <p:tgtEl>
+                                          <p:spTgt spid="3"/>
+                                        </p:tgtEl>
+                                        <p:attrNameLst>
+                                          <p:attrName>style.visibility</p:attrName>
+                                        </p:attrNameLst>
+                                      </p:cBhvr>
+                                      <p:to>
+                                        <p:strVal val="visible"/>
+                                      </p:to>
+                                    </p:set>
+                                  </p:childTnLst>
+                                </p:cTn>
+                              </p:par>
+                            </p:childTnLst>
+                          </p:cTn>
+                        </p:par>
+                      </p:childTnLst>
+                    </p:cTn>
+                  </p:par>
+                </p:childTnLst>
+              </p:cTn>
+              <p:prevCondLst>
+                <p:cond evt="onPrev" delay="0">
+                  <p:tgtEl>
+                    <p:sldTgt/>
+                  </p:tgtEl>
+                </p:cond>
+              </p:prevCondLst>
+              <p:nextCondLst>
+                <p:cond evt="onNext" delay="0">
+                  <p:tgtEl>
+                    <p:sldTgt/>
+                  </p:tgtEl>
+                </p:cond>
+              </p:nextCondLst>
+            </p:seq>
+          </p:childTnLst>
+        </p:cTn>
+      </p:par>
+    </p:tnLst>
+  </p:timing>
+</p:sld>
+</file>
+
+<file path=ppt/slides/slide5.xml><?xml version="1.0" encoding="utf-8"?>
+<p:sld xmlns:a="http://schemas.openxmlformats.org/drawingml/2006/main" xmlns:r="http://schemas.openxmlformats.org/officeDocument/2006/relationships" xmlns:p="http://schemas.openxmlformats.org/presentationml/2006/main">
+  <p:cSld>
+    <p:spTree>
+      <p:nvGrpSpPr>
+        <p:cNvPr id="1" name=""/>
+        <p:cNvGrpSpPr/>
+        <p:nvPr/>
+      </p:nvGrpSpPr>
+      <p:grpSpPr>
+        <a:xfrm>
+          <a:off x="0" y="0"/>
+          <a:ext cx="0" cy="0"/>
+          <a:chOff x="0" y="0"/>
+          <a:chExt cx="0" cy="0"/>
+        </a:xfrm>
+      </p:grpSpPr>
+      <p:sp>
+        <p:nvSpPr>
+          <p:cNvPr id="2" name="標題 1">
+            <a:extLst>
+              <a:ext uri="{FF2B5EF4-FFF2-40B4-BE49-F238E27FC236}">
+                <a16:creationId xmlns:a16="http://schemas.microsoft.com/office/drawing/2014/main" id="{521FF66F-721D-4C58-AE64-FFE545614FD9}"/>
+              </a:ext>
+            </a:extLst>
+          </p:cNvPr>
+          <p:cNvSpPr>
+            <a:spLocks noGrp="1"/>
+          </p:cNvSpPr>
+          <p:nvPr>
+            <p:ph type="title"/>
+          </p:nvPr>
+        </p:nvSpPr>
+        <p:spPr>
+          <a:xfrm>
+            <a:off x="838200" y="205468"/>
+            <a:ext cx="10515600" cy="1325563"/>
+          </a:xfrm>
+        </p:spPr>
+        <p:txBody>
+          <a:bodyPr>
+            <a:normAutofit/>
+          </a:bodyPr>
+          <a:lstStyle/>
+          <a:p>
+            <a:pPr algn="ctr"/>
+            <a:r>
+              <a:rPr lang="zh-TW" altLang="en-US" sz="4800">
+                <a:solidFill>
+                  <a:srgbClr val="8CE1EB"/>
+                </a:solidFill>
+                <a:latin typeface="Verdana"/>
+                <a:ea typeface="新細明體"/>
+                <a:cs typeface="Calibri Light"/>
+              </a:rPr>
+              <a:t>Components Used</a:t>
+            </a:r>
+            <a:endParaRPr lang="zh-TW" altLang="en-US" sz="4800" dirty="0">
+              <a:solidFill>
+                <a:srgbClr val="8CE1EB"/>
+              </a:solidFill>
+              <a:latin typeface="Verdana"/>
+              <a:ea typeface="新細明體"/>
+              <a:cs typeface="Calibri Light"/>
+            </a:endParaRPr>
+          </a:p>
+        </p:txBody>
+      </p:sp>
+      <p:pic>
+        <p:nvPicPr>
+          <p:cNvPr id="4" name="圖片 6" descr="一張含有 文字, 螢幕擷取畫面, 電子用品 的圖片&#10;&#10;自動產生的描述">
+            <a:extLst>
+              <a:ext uri="{FF2B5EF4-FFF2-40B4-BE49-F238E27FC236}">
+                <a16:creationId xmlns:a16="http://schemas.microsoft.com/office/drawing/2014/main" id="{DD8E9C3A-8111-4E7D-8E17-EB3B153DD88A}"/>
+              </a:ext>
+            </a:extLst>
+          </p:cNvPr>
+          <p:cNvPicPr>
+            <a:picLocks noChangeAspect="1"/>
+          </p:cNvPicPr>
+          <p:nvPr/>
+        </p:nvPicPr>
+        <p:blipFill>
+          <a:blip r:embed="rId2"/>
+          <a:stretch>
+            <a:fillRect/>
+          </a:stretch>
+        </p:blipFill>
+        <p:spPr>
+          <a:xfrm>
+            <a:off x="624115" y="2367736"/>
+            <a:ext cx="4601029" cy="3240124"/>
+          </a:xfrm>
+          <a:prstGeom prst="rect">
+            <a:avLst/>
+          </a:prstGeom>
+          <a:ln w="28575">
+            <a:solidFill>
+              <a:srgbClr val="8CE1EB"/>
+            </a:solidFill>
+          </a:ln>
+        </p:spPr>
+      </p:pic>
+      <p:sp>
+        <p:nvSpPr>
+          <p:cNvPr id="8" name="文字方塊 7">
+            <a:extLst>
+              <a:ext uri="{FF2B5EF4-FFF2-40B4-BE49-F238E27FC236}">
+                <a16:creationId xmlns:a16="http://schemas.microsoft.com/office/drawing/2014/main" id="{76C38D3F-F433-4CE3-A205-F71F621E4EAE}"/>
+              </a:ext>
+            </a:extLst>
+          </p:cNvPr>
+          <p:cNvSpPr txBox="1"/>
+          <p:nvPr/>
+        </p:nvSpPr>
+        <p:spPr>
+          <a:xfrm>
+            <a:off x="5624286" y="2235199"/>
+            <a:ext cx="6197598" cy="3416320"/>
+          </a:xfrm>
+          <a:prstGeom prst="rect">
+            <a:avLst/>
+          </a:prstGeom>
+          <a:noFill/>
+        </p:spPr>
+        <p:txBody>
+          <a:bodyPr rot="0" spcFirstLastPara="0" vertOverflow="overflow" horzOverflow="overflow" vert="horz" wrap="square" lIns="91440" tIns="45720" rIns="91440" bIns="45720" numCol="1" spcCol="0" rtlCol="0" fromWordArt="0" anchor="t" anchorCtr="0" forceAA="0" compatLnSpc="1">
+            <a:prstTxWarp prst="textNoShape">
+              <a:avLst/>
+            </a:prstTxWarp>
+            <a:spAutoFit/>
+          </a:bodyPr>
+          <a:lstStyle/>
+          <a:p>
+            <a:r>
+              <a:rPr lang="zh-TW" altLang="en-US" sz="3600">
+                <a:solidFill>
+                  <a:srgbClr val="8CE1EB"/>
+                </a:solidFill>
+                <a:ea typeface="新細明體"/>
+                <a:cs typeface="Calibri"/>
+              </a:rPr>
+              <a:t>Use of Grid to:</a:t>
+            </a:r>
+            <a:endParaRPr lang="zh-TW" altLang="en-US" sz="3600" dirty="0">
+              <a:solidFill>
+                <a:srgbClr val="8CE1EB"/>
+              </a:solidFill>
+              <a:ea typeface="新細明體"/>
+            </a:endParaRPr>
+          </a:p>
+          <a:p>
+            <a:pPr marL="571500" indent="-571500">
+              <a:buFont typeface="Arial"/>
+              <a:buChar char="•"/>
+            </a:pPr>
+            <a:r>
+              <a:rPr lang="zh-TW" altLang="en-US" sz="3600">
+                <a:solidFill>
+                  <a:srgbClr val="8CE1EB"/>
+                </a:solidFill>
+                <a:ea typeface="新細明體"/>
+              </a:rPr>
+              <a:t>Break up &lt;main&gt; into sections of .intro and .main-content</a:t>
+            </a:r>
+          </a:p>
+          <a:p>
+            <a:pPr marL="571500" indent="-571500">
+              <a:buFont typeface="Arial"/>
+              <a:buChar char="•"/>
+            </a:pPr>
+            <a:r>
+              <a:rPr lang="zh-TW" altLang="en-US" sz="3600">
+                <a:solidFill>
+                  <a:srgbClr val="8CE1EB"/>
+                </a:solidFill>
+                <a:ea typeface="新細明體"/>
+                <a:cs typeface="Calibri"/>
+              </a:rPr>
+              <a:t>Divs for each portfolio and blog post</a:t>
+            </a:r>
+            <a:endParaRPr lang="zh-TW" altLang="en-US" sz="3600" dirty="0">
+              <a:solidFill>
+                <a:srgbClr val="8CE1EB"/>
+              </a:solidFill>
+              <a:ea typeface="新細明體"/>
+              <a:cs typeface="Calibri"/>
+            </a:endParaRPr>
+          </a:p>
+        </p:txBody>
+      </p:sp>
+    </p:spTree>
+    <p:extLst>
+      <p:ext uri="{BB962C8B-B14F-4D97-AF65-F5344CB8AC3E}">
+        <p14:creationId xmlns:p14="http://schemas.microsoft.com/office/powerpoint/2010/main" val="3615002084"/>
+      </p:ext>
+    </p:extLst>
+  </p:cSld>
+  <p:clrMapOvr>
+    <a:masterClrMapping/>
+  </p:clrMapOvr>
+</p:sld>
+</file>
+
+<file path=ppt/slides/slide6.xml><?xml version="1.0" encoding="utf-8"?>
+<p:sld xmlns:a="http://schemas.openxmlformats.org/drawingml/2006/main" xmlns:r="http://schemas.openxmlformats.org/officeDocument/2006/relationships" xmlns:p="http://schemas.openxmlformats.org/presentationml/2006/main">
+  <p:cSld>
+    <p:spTree>
+      <p:nvGrpSpPr>
+        <p:cNvPr id="1" name=""/>
+        <p:cNvGrpSpPr/>
+        <p:nvPr/>
+      </p:nvGrpSpPr>
+      <p:grpSpPr>
+        <a:xfrm>
+          <a:off x="0" y="0"/>
+          <a:ext cx="0" cy="0"/>
+          <a:chOff x="0" y="0"/>
+          <a:chExt cx="0" cy="0"/>
+        </a:xfrm>
+      </p:grpSpPr>
+      <p:sp>
+        <p:nvSpPr>
+          <p:cNvPr id="2" name="標題 1">
+            <a:extLst>
+              <a:ext uri="{FF2B5EF4-FFF2-40B4-BE49-F238E27FC236}">
+                <a16:creationId xmlns:a16="http://schemas.microsoft.com/office/drawing/2014/main" id="{521FF66F-721D-4C58-AE64-FFE545614FD9}"/>
+              </a:ext>
+            </a:extLst>
+          </p:cNvPr>
+          <p:cNvSpPr>
+            <a:spLocks noGrp="1"/>
+          </p:cNvSpPr>
+          <p:nvPr>
+            <p:ph type="title"/>
+          </p:nvPr>
+        </p:nvSpPr>
+        <p:spPr>
+          <a:xfrm>
+            <a:off x="504372" y="205468"/>
+            <a:ext cx="11183256" cy="1325563"/>
+          </a:xfrm>
+        </p:spPr>
+        <p:txBody>
+          <a:bodyPr>
+            <a:normAutofit/>
+          </a:bodyPr>
+          <a:lstStyle/>
+          <a:p>
+            <a:pPr algn="ctr"/>
+            <a:r>
+              <a:rPr lang="zh-TW" altLang="en-US" sz="4800">
+                <a:solidFill>
+                  <a:srgbClr val="8CE1EB"/>
+                </a:solidFill>
+                <a:latin typeface="Verdana"/>
+                <a:ea typeface="新細明體"/>
+                <a:cs typeface="Calibri Light"/>
+              </a:rPr>
+              <a:t>Wireframes @ lower than 1024px</a:t>
+            </a:r>
+          </a:p>
+        </p:txBody>
+      </p:sp>
+      <p:sp>
+        <p:nvSpPr>
+          <p:cNvPr id="8" name="文字方塊 7">
+            <a:extLst>
+              <a:ext uri="{FF2B5EF4-FFF2-40B4-BE49-F238E27FC236}">
+                <a16:creationId xmlns:a16="http://schemas.microsoft.com/office/drawing/2014/main" id="{2242D533-C4A7-4F8B-A5D0-54FED0C84244}"/>
+              </a:ext>
+            </a:extLst>
+          </p:cNvPr>
+          <p:cNvSpPr txBox="1"/>
+          <p:nvPr/>
+        </p:nvSpPr>
+        <p:spPr>
+          <a:xfrm>
+            <a:off x="740227" y="1444171"/>
+            <a:ext cx="2184399" cy="707886"/>
+          </a:xfrm>
+          <a:prstGeom prst="rect">
+            <a:avLst/>
+          </a:prstGeom>
+          <a:noFill/>
+        </p:spPr>
+        <p:txBody>
+          <a:bodyPr rot="0" spcFirstLastPara="0" vertOverflow="overflow" horzOverflow="overflow" vert="horz" wrap="square" lIns="91440" tIns="45720" rIns="91440" bIns="45720" numCol="1" spcCol="0" rtlCol="0" fromWordArt="0" anchor="t" anchorCtr="0" forceAA="0" compatLnSpc="1">
+            <a:prstTxWarp prst="textNoShape">
+              <a:avLst/>
+            </a:prstTxWarp>
+            <a:spAutoFit/>
+          </a:bodyPr>
+          <a:lstStyle/>
+          <a:p>
+            <a:pPr algn="l"/>
+            <a:r>
+              <a:rPr lang="zh-TW" altLang="en-US" sz="4000">
+                <a:solidFill>
+                  <a:srgbClr val="8CE1EB"/>
+                </a:solidFill>
+                <a:ea typeface="新細明體"/>
+              </a:rPr>
+              <a:t>Contact</a:t>
+            </a:r>
+            <a:endParaRPr lang="zh-TW" altLang="en-US" sz="4000">
+              <a:solidFill>
+                <a:srgbClr val="8CE1EB"/>
+              </a:solidFill>
+            </a:endParaRPr>
+          </a:p>
+        </p:txBody>
+      </p:sp>
+      <p:sp>
+        <p:nvSpPr>
+          <p:cNvPr id="11" name="文字方塊 10">
+            <a:extLst>
+              <a:ext uri="{FF2B5EF4-FFF2-40B4-BE49-F238E27FC236}">
+                <a16:creationId xmlns:a16="http://schemas.microsoft.com/office/drawing/2014/main" id="{02184437-5F47-4999-8152-CCF82A53973F}"/>
+              </a:ext>
+            </a:extLst>
+          </p:cNvPr>
+          <p:cNvSpPr txBox="1"/>
+          <p:nvPr/>
+        </p:nvSpPr>
+        <p:spPr>
+          <a:xfrm>
+            <a:off x="5464627" y="1444170"/>
+            <a:ext cx="1473199" cy="707886"/>
+          </a:xfrm>
+          <a:prstGeom prst="rect">
+            <a:avLst/>
+          </a:prstGeom>
+          <a:noFill/>
+        </p:spPr>
+        <p:txBody>
+          <a:bodyPr rot="0" spcFirstLastPara="0" vertOverflow="overflow" horzOverflow="overflow" vert="horz" wrap="square" lIns="91440" tIns="45720" rIns="91440" bIns="45720" numCol="1" spcCol="0" rtlCol="0" fromWordArt="0" anchor="t" anchorCtr="0" forceAA="0" compatLnSpc="1">
+            <a:prstTxWarp prst="textNoShape">
+              <a:avLst/>
+            </a:prstTxWarp>
+            <a:spAutoFit/>
+          </a:bodyPr>
+          <a:lstStyle/>
+          <a:p>
+            <a:pPr algn="l"/>
+            <a:r>
+              <a:rPr lang="zh-TW" altLang="en-US" sz="4000">
+                <a:solidFill>
+                  <a:srgbClr val="8CE1EB"/>
+                </a:solidFill>
+                <a:ea typeface="新細明體"/>
+                <a:cs typeface="Calibri" panose="020F0502020204030204"/>
+              </a:rPr>
+              <a:t>Home</a:t>
+            </a:r>
+          </a:p>
+        </p:txBody>
+      </p:sp>
+      <p:pic>
+        <p:nvPicPr>
+          <p:cNvPr id="3" name="圖片 3">
+            <a:extLst>
+              <a:ext uri="{FF2B5EF4-FFF2-40B4-BE49-F238E27FC236}">
+                <a16:creationId xmlns:a16="http://schemas.microsoft.com/office/drawing/2014/main" id="{51FF8006-467A-47A8-A6B6-F40C8603EA3B}"/>
+              </a:ext>
+            </a:extLst>
+          </p:cNvPr>
+          <p:cNvPicPr>
+            <a:picLocks noChangeAspect="1"/>
+          </p:cNvPicPr>
+          <p:nvPr/>
+        </p:nvPicPr>
+        <p:blipFill>
+          <a:blip r:embed="rId2"/>
+          <a:stretch>
+            <a:fillRect/>
+          </a:stretch>
+        </p:blipFill>
+        <p:spPr>
+          <a:xfrm>
+            <a:off x="457200" y="2508178"/>
+            <a:ext cx="2743200" cy="3917187"/>
+          </a:xfrm>
+          <a:prstGeom prst="rect">
+            <a:avLst/>
+          </a:prstGeom>
+          <a:ln w="28575">
+            <a:solidFill>
+              <a:srgbClr val="8CE1EB"/>
+            </a:solidFill>
+          </a:ln>
+        </p:spPr>
+      </p:pic>
+      <p:pic>
+        <p:nvPicPr>
+          <p:cNvPr id="4" name="圖片 5" descr="一張含有 文字 的圖片&#10;&#10;自動產生的描述">
+            <a:extLst>
+              <a:ext uri="{FF2B5EF4-FFF2-40B4-BE49-F238E27FC236}">
+                <a16:creationId xmlns:a16="http://schemas.microsoft.com/office/drawing/2014/main" id="{4C3788FC-4383-400A-8E97-EBAF491EEAF5}"/>
+              </a:ext>
+            </a:extLst>
+          </p:cNvPr>
+          <p:cNvPicPr>
+            <a:picLocks noChangeAspect="1"/>
+          </p:cNvPicPr>
+          <p:nvPr/>
+        </p:nvPicPr>
+        <p:blipFill>
+          <a:blip r:embed="rId3"/>
+          <a:stretch>
+            <a:fillRect/>
+          </a:stretch>
+        </p:blipFill>
+        <p:spPr>
+          <a:xfrm>
+            <a:off x="2927404" y="1799772"/>
+            <a:ext cx="1924850" cy="4114800"/>
+          </a:xfrm>
+          <a:prstGeom prst="rect">
+            <a:avLst/>
+          </a:prstGeom>
+          <a:ln w="28575">
+            <a:solidFill>
+              <a:srgbClr val="8CE1EB"/>
+            </a:solidFill>
+          </a:ln>
+        </p:spPr>
+      </p:pic>
+      <p:pic>
+        <p:nvPicPr>
+          <p:cNvPr id="6" name="圖片 8">
+            <a:extLst>
+              <a:ext uri="{FF2B5EF4-FFF2-40B4-BE49-F238E27FC236}">
+                <a16:creationId xmlns:a16="http://schemas.microsoft.com/office/drawing/2014/main" id="{6A7B043D-1695-44FB-8693-F41E433AB067}"/>
+              </a:ext>
+            </a:extLst>
+          </p:cNvPr>
+          <p:cNvPicPr>
+            <a:picLocks noChangeAspect="1"/>
+          </p:cNvPicPr>
+          <p:nvPr/>
+        </p:nvPicPr>
+        <p:blipFill>
+          <a:blip r:embed="rId4"/>
+          <a:stretch>
+            <a:fillRect/>
+          </a:stretch>
+        </p:blipFill>
+        <p:spPr>
+          <a:xfrm>
+            <a:off x="4826000" y="2892806"/>
+            <a:ext cx="2743200" cy="3641416"/>
+          </a:xfrm>
+          <a:prstGeom prst="rect">
+            <a:avLst/>
+          </a:prstGeom>
+          <a:ln w="28575">
+            <a:solidFill>
+              <a:srgbClr val="8CE1EB"/>
+            </a:solidFill>
+          </a:ln>
+        </p:spPr>
+      </p:pic>
+      <p:pic>
+        <p:nvPicPr>
+          <p:cNvPr id="9" name="圖片 9" descr="一張含有 文字 的圖片&#10;&#10;自動產生的描述">
+            <a:extLst>
+              <a:ext uri="{FF2B5EF4-FFF2-40B4-BE49-F238E27FC236}">
+                <a16:creationId xmlns:a16="http://schemas.microsoft.com/office/drawing/2014/main" id="{FEAFCDCB-DA84-4927-B7DA-03D6815266C4}"/>
+              </a:ext>
+            </a:extLst>
+          </p:cNvPr>
+          <p:cNvPicPr>
+            <a:picLocks noChangeAspect="1"/>
+          </p:cNvPicPr>
+          <p:nvPr/>
+        </p:nvPicPr>
+        <p:blipFill>
+          <a:blip r:embed="rId5"/>
+          <a:stretch>
+            <a:fillRect/>
+          </a:stretch>
+        </p:blipFill>
+        <p:spPr>
+          <a:xfrm>
+            <a:off x="7238146" y="1799771"/>
+            <a:ext cx="1924850" cy="4114800"/>
+          </a:xfrm>
+          <a:prstGeom prst="rect">
+            <a:avLst/>
+          </a:prstGeom>
+          <a:ln w="28575">
+            <a:solidFill>
+              <a:srgbClr val="8CE1EB"/>
+            </a:solidFill>
+          </a:ln>
+        </p:spPr>
+      </p:pic>
+      <p:pic>
+        <p:nvPicPr>
+          <p:cNvPr id="10" name="圖片 11">
+            <a:extLst>
+              <a:ext uri="{FF2B5EF4-FFF2-40B4-BE49-F238E27FC236}">
+                <a16:creationId xmlns:a16="http://schemas.microsoft.com/office/drawing/2014/main" id="{9A4E7BD9-1F52-474E-BAC6-C593AA79B020}"/>
+              </a:ext>
+            </a:extLst>
+          </p:cNvPr>
+          <p:cNvPicPr>
+            <a:picLocks noChangeAspect="1"/>
+          </p:cNvPicPr>
+          <p:nvPr/>
+        </p:nvPicPr>
+        <p:blipFill>
+          <a:blip r:embed="rId6"/>
+          <a:stretch>
+            <a:fillRect/>
+          </a:stretch>
+        </p:blipFill>
+        <p:spPr>
+          <a:xfrm>
+            <a:off x="8200571" y="2631549"/>
+            <a:ext cx="2743200" cy="3641416"/>
+          </a:xfrm>
+          <a:prstGeom prst="rect">
+            <a:avLst/>
+          </a:prstGeom>
+          <a:ln w="28575">
+            <a:solidFill>
+              <a:srgbClr val="8CE1EB"/>
+            </a:solidFill>
+          </a:ln>
+        </p:spPr>
+      </p:pic>
+      <p:pic>
+        <p:nvPicPr>
+          <p:cNvPr id="12" name="圖片 12" descr="一張含有 文字 的圖片&#10;&#10;自動產生的描述">
+            <a:extLst>
+              <a:ext uri="{FF2B5EF4-FFF2-40B4-BE49-F238E27FC236}">
+                <a16:creationId xmlns:a16="http://schemas.microsoft.com/office/drawing/2014/main" id="{E06E5F9A-F49F-47A9-9C65-8499C2F8E121}"/>
+              </a:ext>
+            </a:extLst>
+          </p:cNvPr>
+          <p:cNvPicPr>
+            <a:picLocks noChangeAspect="1"/>
+          </p:cNvPicPr>
+          <p:nvPr/>
+        </p:nvPicPr>
+        <p:blipFill>
+          <a:blip r:embed="rId7"/>
+          <a:stretch>
+            <a:fillRect/>
+          </a:stretch>
+        </p:blipFill>
+        <p:spPr>
+          <a:xfrm>
+            <a:off x="9828946" y="2344057"/>
+            <a:ext cx="1924850" cy="4114800"/>
+          </a:xfrm>
+          <a:prstGeom prst="rect">
+            <a:avLst/>
+          </a:prstGeom>
+          <a:ln w="28575">
+            <a:solidFill>
+              <a:srgbClr val="8CE1EB"/>
+            </a:solidFill>
+          </a:ln>
+        </p:spPr>
+      </p:pic>
+      <p:sp>
+        <p:nvSpPr>
+          <p:cNvPr id="13" name="文字方塊 12">
+            <a:extLst>
+              <a:ext uri="{FF2B5EF4-FFF2-40B4-BE49-F238E27FC236}">
+                <a16:creationId xmlns:a16="http://schemas.microsoft.com/office/drawing/2014/main" id="{AA9DD0A3-973C-4368-AD79-17899CC19143}"/>
+              </a:ext>
+            </a:extLst>
+          </p:cNvPr>
+          <p:cNvSpPr txBox="1"/>
+          <p:nvPr/>
+        </p:nvSpPr>
+        <p:spPr>
+          <a:xfrm>
+            <a:off x="10058398" y="1444169"/>
+            <a:ext cx="1473199" cy="707886"/>
+          </a:xfrm>
+          <a:prstGeom prst="rect">
+            <a:avLst/>
+          </a:prstGeom>
+          <a:noFill/>
+        </p:spPr>
+        <p:txBody>
+          <a:bodyPr rot="0" spcFirstLastPara="0" vertOverflow="overflow" horzOverflow="overflow" vert="horz" wrap="square" lIns="91440" tIns="45720" rIns="91440" bIns="45720" numCol="1" spcCol="0" rtlCol="0" fromWordArt="0" anchor="t" anchorCtr="0" forceAA="0" compatLnSpc="1">
+            <a:prstTxWarp prst="textNoShape">
+              <a:avLst/>
+            </a:prstTxWarp>
+            <a:spAutoFit/>
+          </a:bodyPr>
+          <a:lstStyle/>
+          <a:p>
+            <a:pPr algn="l"/>
+            <a:r>
+              <a:rPr lang="zh-TW" altLang="en-US" sz="4000">
+                <a:solidFill>
+                  <a:srgbClr val="8CE1EB"/>
+                </a:solidFill>
+                <a:ea typeface="新細明體"/>
+                <a:cs typeface="Calibri" panose="020F0502020204030204"/>
+              </a:rPr>
+              <a:t>About</a:t>
+            </a:r>
+          </a:p>
+        </p:txBody>
+      </p:sp>
+    </p:spTree>
+    <p:extLst>
+      <p:ext uri="{BB962C8B-B14F-4D97-AF65-F5344CB8AC3E}">
+        <p14:creationId xmlns:p14="http://schemas.microsoft.com/office/powerpoint/2010/main" val="1373712711"/>
+      </p:ext>
+    </p:extLst>
+  </p:cSld>
+  <p:clrMapOvr>
+    <a:masterClrMapping/>
+  </p:clrMapOvr>
+  <p:timing>
+    <p:tnLst>
+      <p:par>
+        <p:cTn id="1" dur="indefinite" restart="never" nodeType="tmRoot">
+          <p:childTnLst>
+            <p:seq concurrent="1" nextAc="seek">
+              <p:cTn id="2" dur="indefinite" nodeType="mainSeq">
+                <p:childTnLst>
+                  <p:par>
+                    <p:cTn id="3" fill="hold">
+                      <p:stCondLst>
+                        <p:cond delay="indefinite"/>
+                      </p:stCondLst>
+                      <p:childTnLst>
+                        <p:par>
+                          <p:cTn id="4" fill="hold">
+                            <p:stCondLst>
+                              <p:cond delay="0"/>
+                            </p:stCondLst>
+                            <p:childTnLst>
+                              <p:par>
+                                <p:cTn id="5" presetID="1" presetClass="entr" presetSubtype="0" fill="hold" nodeType="clickEffect">
+                                  <p:stCondLst>
+                                    <p:cond delay="0"/>
+                                  </p:stCondLst>
+                                  <p:childTnLst>
+                                    <p:set>
+                                      <p:cBhvr>
+                                        <p:cTn id="6" dur="1" fill="hold">
+                                          <p:stCondLst>
+                                            <p:cond delay="0"/>
+                                          </p:stCondLst>
+                                        </p:cTn>
+                                        <p:tgtEl>
+                                          <p:spTgt spid="3"/>
+                                        </p:tgtEl>
+                                        <p:attrNameLst>
+                                          <p:attrName>style.visibility</p:attrName>
+                                        </p:attrNameLst>
+                                      </p:cBhvr>
+                                      <p:to>
+                                        <p:strVal val="visible"/>
+                                      </p:to>
+                                    </p:set>
+                                  </p:childTnLst>
+                                </p:cTn>
+                              </p:par>
+                            </p:childTnLst>
+                          </p:cTn>
+                        </p:par>
+                      </p:childTnLst>
+                    </p:cTn>
+                  </p:par>
+                  <p:par>
+                    <p:cTn id="7" fill="hold">
+                      <p:stCondLst>
+                        <p:cond delay="indefinite"/>
+                      </p:stCondLst>
+                      <p:childTnLst>
+                        <p:par>
+                          <p:cTn id="8" fill="hold">
+                            <p:stCondLst>
+                              <p:cond delay="0"/>
+                            </p:stCondLst>
+                            <p:childTnLst>
+                              <p:par>
+                                <p:cTn id="9" presetID="1" presetClass="entr" presetSubtype="0" fill="hold" nodeType="clickEffect">
+                                  <p:stCondLst>
+                                    <p:cond delay="0"/>
+                                  </p:stCondLst>
+                                  <p:childTnLst>
+                                    <p:set>
+                                      <p:cBhvr>
+                                        <p:cTn id="10" dur="1" fill="hold">
+                                          <p:stCondLst>
+                                            <p:cond delay="0"/>
+                                          </p:stCondLst>
+                                        </p:cTn>
+                                        <p:tgtEl>
+                                          <p:spTgt spid="4"/>
+                                        </p:tgtEl>
+                                        <p:attrNameLst>
+                                          <p:attrName>style.visibility</p:attrName>
+                                        </p:attrNameLst>
+                                      </p:cBhvr>
+                                      <p:to>
+                                        <p:strVal val="visible"/>
+                                      </p:to>
+                                    </p:set>
+                                  </p:childTnLst>
+                                </p:cTn>
+                              </p:par>
+                            </p:childTnLst>
+                          </p:cTn>
+                        </p:par>
+                      </p:childTnLst>
+                    </p:cTn>
+                  </p:par>
+                  <p:par>
+                    <p:cTn id="11" fill="hold">
+                      <p:stCondLst>
+                        <p:cond delay="indefinite"/>
+                      </p:stCondLst>
+                      <p:childTnLst>
+                        <p:par>
+                          <p:cTn id="12" fill="hold">
+                            <p:stCondLst>
+                              <p:cond delay="0"/>
+                            </p:stCondLst>
+                            <p:childTnLst>
+                              <p:par>
+                                <p:cTn id="13" presetID="1" presetClass="entr" presetSubtype="0" fill="hold" nodeType="clickEffect">
+                                  <p:stCondLst>
+                                    <p:cond delay="0"/>
+                                  </p:stCondLst>
+                                  <p:childTnLst>
+                                    <p:set>
+                                      <p:cBhvr>
+                                        <p:cTn id="14" dur="1" fill="hold">
+                                          <p:stCondLst>
+                                            <p:cond delay="0"/>
+                                          </p:stCondLst>
+                                        </p:cTn>
+                                        <p:tgtEl>
+                                          <p:spTgt spid="6"/>
+                                        </p:tgtEl>
+                                        <p:attrNameLst>
+                                          <p:attrName>style.visibility</p:attrName>
+                                        </p:attrNameLst>
+                                      </p:cBhvr>
+                                      <p:to>
+                                        <p:strVal val="visible"/>
+                                      </p:to>
+                                    </p:set>
+                                  </p:childTnLst>
+                                </p:cTn>
+                              </p:par>
+                            </p:childTnLst>
+                          </p:cTn>
+                        </p:par>
+                      </p:childTnLst>
+                    </p:cTn>
+                  </p:par>
+                  <p:par>
+                    <p:cTn id="15" fill="hold">
+                      <p:stCondLst>
+                        <p:cond delay="indefinite"/>
+                      </p:stCondLst>
+                      <p:childTnLst>
+                        <p:par>
+                          <p:cTn id="16" fill="hold">
+                            <p:stCondLst>
+                              <p:cond delay="0"/>
+                            </p:stCondLst>
+                            <p:childTnLst>
+                              <p:par>
+                                <p:cTn id="17" presetID="1" presetClass="entr" presetSubtype="0" fill="hold" nodeType="clickEffect">
+                                  <p:stCondLst>
+                                    <p:cond delay="0"/>
+                                  </p:stCondLst>
+                                  <p:childTnLst>
+                                    <p:set>
+                                      <p:cBhvr>
+                                        <p:cTn id="18" dur="1" fill="hold">
+                                          <p:stCondLst>
+                                            <p:cond delay="0"/>
+                                          </p:stCondLst>
+                                        </p:cTn>
+                                        <p:tgtEl>
+                                          <p:spTgt spid="9"/>
+                                        </p:tgtEl>
+                                        <p:attrNameLst>
+                                          <p:attrName>style.visibility</p:attrName>
+                                        </p:attrNameLst>
+                                      </p:cBhvr>
+                                      <p:to>
+                                        <p:strVal val="visible"/>
+                                      </p:to>
+                                    </p:set>
+                                  </p:childTnLst>
+                                </p:cTn>
+                              </p:par>
+                            </p:childTnLst>
+                          </p:cTn>
+                        </p:par>
+                      </p:childTnLst>
+                    </p:cTn>
+                  </p:par>
+                  <p:par>
+                    <p:cTn id="19" fill="hold">
+                      <p:stCondLst>
+                        <p:cond delay="indefinite"/>
+                      </p:stCondLst>
+                      <p:childTnLst>
+                        <p:par>
+                          <p:cTn id="20" fill="hold">
+                            <p:stCondLst>
+                              <p:cond delay="0"/>
+                            </p:stCondLst>
+                            <p:childTnLst>
+                              <p:par>
+                                <p:cTn id="21" presetID="1" presetClass="entr" presetSubtype="0" fill="hold" nodeType="clickEffect">
+                                  <p:stCondLst>
+                                    <p:cond delay="0"/>
+                                  </p:stCondLst>
+                                  <p:childTnLst>
+                                    <p:set>
+                                      <p:cBhvr>
+                                        <p:cTn id="22" dur="1" fill="hold">
+                                          <p:stCondLst>
+                                            <p:cond delay="0"/>
+                                          </p:stCondLst>
+                                        </p:cTn>
+                                        <p:tgtEl>
+                                          <p:spTgt spid="10"/>
+                                        </p:tgtEl>
+                                        <p:attrNameLst>
+                                          <p:attrName>style.visibility</p:attrName>
+                                        </p:attrNameLst>
+                                      </p:cBhvr>
+                                      <p:to>
+                                        <p:strVal val="visible"/>
+                                      </p:to>
+                                    </p:set>
+                                  </p:childTnLst>
+                                </p:cTn>
+                              </p:par>
+                            </p:childTnLst>
+                          </p:cTn>
+                        </p:par>
+                      </p:childTnLst>
+                    </p:cTn>
+                  </p:par>
+                  <p:par>
+                    <p:cTn id="23" fill="hold">
+                      <p:stCondLst>
+                        <p:cond delay="indefinite"/>
+                      </p:stCondLst>
+                      <p:childTnLst>
+                        <p:par>
+                          <p:cTn id="24" fill="hold">
+                            <p:stCondLst>
+                              <p:cond delay="0"/>
+                            </p:stCondLst>
+                            <p:childTnLst>
+                              <p:par>
+                                <p:cTn id="25" presetID="1" presetClass="entr" presetSubtype="0" fill="hold" nodeType="clickEffect">
+                                  <p:stCondLst>
+                                    <p:cond delay="0"/>
+                                  </p:stCondLst>
+                                  <p:childTnLst>
+                                    <p:set>
+                                      <p:cBhvr>
+                                        <p:cTn id="26" dur="1" fill="hold">
+                                          <p:stCondLst>
+                                            <p:cond delay="0"/>
+                                          </p:stCondLst>
+                                        </p:cTn>
+                                        <p:tgtEl>
+                                          <p:spTgt spid="12"/>
+                                        </p:tgtEl>
+                                        <p:attrNameLst>
+                                          <p:attrName>style.visibility</p:attrName>
+                                        </p:attrNameLst>
+                                      </p:cBhvr>
+                                      <p:to>
+                                        <p:strVal val="visible"/>
+                                      </p:to>
+                                    </p:set>
+                                  </p:childTnLst>
+                                </p:cTn>
+                              </p:par>
+                            </p:childTnLst>
+                          </p:cTn>
+                        </p:par>
+                      </p:childTnLst>
+                    </p:cTn>
+                  </p:par>
+                </p:childTnLst>
+              </p:cTn>
+              <p:prevCondLst>
+                <p:cond evt="onPrev" delay="0">
+                  <p:tgtEl>
+                    <p:sldTgt/>
+                  </p:tgtEl>
+                </p:cond>
+              </p:prevCondLst>
+              <p:nextCondLst>
+                <p:cond evt="onNext" delay="0">
+                  <p:tgtEl>
+                    <p:sldTgt/>
+                  </p:tgtEl>
+                </p:cond>
+              </p:nextCondLst>
+            </p:seq>
+          </p:childTnLst>
+        </p:cTn>
+      </p:par>
+    </p:tnLst>
+  </p:timing>
+</p:sld>
+</file>
+
+<file path=ppt/slides/slide7.xml><?xml version="1.0" encoding="utf-8"?>
+<p:sld xmlns:a="http://schemas.openxmlformats.org/drawingml/2006/main" xmlns:r="http://schemas.openxmlformats.org/officeDocument/2006/relationships" xmlns:p="http://schemas.openxmlformats.org/presentationml/2006/main">
+  <p:cSld>
+    <p:spTree>
+      <p:nvGrpSpPr>
+        <p:cNvPr id="1" name=""/>
+        <p:cNvGrpSpPr/>
+        <p:nvPr/>
+      </p:nvGrpSpPr>
+      <p:grpSpPr>
+        <a:xfrm>
+          <a:off x="0" y="0"/>
+          <a:ext cx="0" cy="0"/>
+          <a:chOff x="0" y="0"/>
+          <a:chExt cx="0" cy="0"/>
+        </a:xfrm>
+      </p:grpSpPr>
+      <p:sp>
+        <p:nvSpPr>
+          <p:cNvPr id="2" name="標題 1">
+            <a:extLst>
+              <a:ext uri="{FF2B5EF4-FFF2-40B4-BE49-F238E27FC236}">
+                <a16:creationId xmlns:a16="http://schemas.microsoft.com/office/drawing/2014/main" id="{521FF66F-721D-4C58-AE64-FFE545614FD9}"/>
+              </a:ext>
+            </a:extLst>
+          </p:cNvPr>
+          <p:cNvSpPr>
+            <a:spLocks noGrp="1"/>
+          </p:cNvSpPr>
+          <p:nvPr>
+            <p:ph type="title"/>
+          </p:nvPr>
+        </p:nvSpPr>
+        <p:spPr>
+          <a:xfrm>
+            <a:off x="504372" y="205468"/>
+            <a:ext cx="11183256" cy="1325563"/>
+          </a:xfrm>
+        </p:spPr>
+        <p:txBody>
+          <a:bodyPr>
+            <a:normAutofit/>
+          </a:bodyPr>
+          <a:lstStyle/>
+          <a:p>
+            <a:pPr algn="ctr"/>
+            <a:r>
+              <a:rPr lang="zh-TW" altLang="en-US" sz="4800">
+                <a:solidFill>
+                  <a:srgbClr val="8CE1EB"/>
+                </a:solidFill>
+                <a:latin typeface="Verdana"/>
+                <a:ea typeface="新細明體"/>
+                <a:cs typeface="Calibri Light"/>
+              </a:rPr>
+              <a:t>Wireframes @ lower than 1024px</a:t>
+            </a:r>
+          </a:p>
+        </p:txBody>
+      </p:sp>
+      <p:sp>
+        <p:nvSpPr>
+          <p:cNvPr id="8" name="文字方塊 7">
+            <a:extLst>
+              <a:ext uri="{FF2B5EF4-FFF2-40B4-BE49-F238E27FC236}">
+                <a16:creationId xmlns:a16="http://schemas.microsoft.com/office/drawing/2014/main" id="{2242D533-C4A7-4F8B-A5D0-54FED0C84244}"/>
+              </a:ext>
+            </a:extLst>
+          </p:cNvPr>
+          <p:cNvSpPr txBox="1"/>
+          <p:nvPr/>
+        </p:nvSpPr>
+        <p:spPr>
+          <a:xfrm>
+            <a:off x="950685" y="1444171"/>
+            <a:ext cx="2184399" cy="707886"/>
+          </a:xfrm>
+          <a:prstGeom prst="rect">
+            <a:avLst/>
+          </a:prstGeom>
+          <a:noFill/>
+        </p:spPr>
+        <p:txBody>
+          <a:bodyPr rot="0" spcFirstLastPara="0" vertOverflow="overflow" horzOverflow="overflow" vert="horz" wrap="square" lIns="91440" tIns="45720" rIns="91440" bIns="45720" numCol="1" spcCol="0" rtlCol="0" fromWordArt="0" anchor="t" anchorCtr="0" forceAA="0" compatLnSpc="1">
+            <a:prstTxWarp prst="textNoShape">
+              <a:avLst/>
+            </a:prstTxWarp>
+            <a:spAutoFit/>
+          </a:bodyPr>
+          <a:lstStyle/>
+          <a:p>
+            <a:pPr algn="l"/>
+            <a:r>
+              <a:rPr lang="zh-TW" altLang="en-US" sz="4000">
+                <a:solidFill>
+                  <a:srgbClr val="8CE1EB"/>
+                </a:solidFill>
+                <a:ea typeface="新細明體"/>
+              </a:rPr>
+              <a:t>Portfolio</a:t>
+            </a:r>
+            <a:endParaRPr lang="zh-TW" altLang="en-US" sz="4000">
+              <a:solidFill>
+                <a:srgbClr val="8CE1EB"/>
+              </a:solidFill>
+            </a:endParaRPr>
+          </a:p>
+        </p:txBody>
+      </p:sp>
+      <p:sp>
+        <p:nvSpPr>
+          <p:cNvPr id="11" name="文字方塊 10">
+            <a:extLst>
+              <a:ext uri="{FF2B5EF4-FFF2-40B4-BE49-F238E27FC236}">
+                <a16:creationId xmlns:a16="http://schemas.microsoft.com/office/drawing/2014/main" id="{02184437-5F47-4999-8152-CCF82A53973F}"/>
+              </a:ext>
+            </a:extLst>
+          </p:cNvPr>
+          <p:cNvSpPr txBox="1"/>
+          <p:nvPr/>
+        </p:nvSpPr>
+        <p:spPr>
+          <a:xfrm>
+            <a:off x="9550398" y="1444170"/>
+            <a:ext cx="1313542" cy="707886"/>
+          </a:xfrm>
+          <a:prstGeom prst="rect">
+            <a:avLst/>
+          </a:prstGeom>
+          <a:noFill/>
+        </p:spPr>
+        <p:txBody>
+          <a:bodyPr rot="0" spcFirstLastPara="0" vertOverflow="overflow" horzOverflow="overflow" vert="horz" wrap="square" lIns="91440" tIns="45720" rIns="91440" bIns="45720" numCol="1" spcCol="0" rtlCol="0" fromWordArt="0" anchor="t" anchorCtr="0" forceAA="0" compatLnSpc="1">
+            <a:prstTxWarp prst="textNoShape">
+              <a:avLst/>
+            </a:prstTxWarp>
+            <a:spAutoFit/>
+          </a:bodyPr>
+          <a:lstStyle/>
+          <a:p>
+            <a:pPr algn="l"/>
+            <a:r>
+              <a:rPr lang="zh-TW" altLang="en-US" sz="4000">
+                <a:solidFill>
+                  <a:srgbClr val="8CE1EB"/>
+                </a:solidFill>
+                <a:ea typeface="新細明體"/>
+              </a:rPr>
+              <a:t>Blog</a:t>
+            </a:r>
+            <a:endParaRPr lang="zh-TW" altLang="en-US" sz="4000">
+              <a:solidFill>
+                <a:srgbClr val="8CE1EB"/>
+              </a:solidFill>
+            </a:endParaRPr>
+          </a:p>
+        </p:txBody>
+      </p:sp>
+      <p:pic>
+        <p:nvPicPr>
+          <p:cNvPr id="3" name="圖片 3">
+            <a:extLst>
+              <a:ext uri="{FF2B5EF4-FFF2-40B4-BE49-F238E27FC236}">
+                <a16:creationId xmlns:a16="http://schemas.microsoft.com/office/drawing/2014/main" id="{859E6C09-32EC-4819-858F-C388642621C8}"/>
+              </a:ext>
+            </a:extLst>
+          </p:cNvPr>
+          <p:cNvPicPr>
+            <a:picLocks noChangeAspect="1"/>
+          </p:cNvPicPr>
+          <p:nvPr/>
+        </p:nvPicPr>
+        <p:blipFill>
+          <a:blip r:embed="rId2"/>
+          <a:stretch>
+            <a:fillRect/>
+          </a:stretch>
+        </p:blipFill>
+        <p:spPr>
+          <a:xfrm>
+            <a:off x="667657" y="2392063"/>
+            <a:ext cx="2743200" cy="3641416"/>
+          </a:xfrm>
+          <a:prstGeom prst="rect">
+            <a:avLst/>
+          </a:prstGeom>
+          <a:ln w="28575">
+            <a:solidFill>
+              <a:srgbClr val="8CE1EB"/>
+            </a:solidFill>
+          </a:ln>
+        </p:spPr>
+      </p:pic>
+      <p:pic>
+        <p:nvPicPr>
+          <p:cNvPr id="4" name="圖片 4">
+            <a:extLst>
+              <a:ext uri="{FF2B5EF4-FFF2-40B4-BE49-F238E27FC236}">
+                <a16:creationId xmlns:a16="http://schemas.microsoft.com/office/drawing/2014/main" id="{69848F82-B621-4FDE-B889-6536D7FDFD88}"/>
+              </a:ext>
+            </a:extLst>
+          </p:cNvPr>
+          <p:cNvPicPr>
+            <a:picLocks noChangeAspect="1"/>
+          </p:cNvPicPr>
+          <p:nvPr/>
+        </p:nvPicPr>
+        <p:blipFill>
+          <a:blip r:embed="rId3"/>
+          <a:stretch>
+            <a:fillRect/>
+          </a:stretch>
+        </p:blipFill>
+        <p:spPr>
+          <a:xfrm>
+            <a:off x="3912881" y="2155372"/>
+            <a:ext cx="1913324" cy="4114800"/>
+          </a:xfrm>
+          <a:prstGeom prst="rect">
+            <a:avLst/>
+          </a:prstGeom>
+          <a:ln w="28575">
+            <a:solidFill>
+              <a:srgbClr val="8CE1EB"/>
+            </a:solidFill>
+          </a:ln>
+        </p:spPr>
+      </p:pic>
+      <p:pic>
+        <p:nvPicPr>
+          <p:cNvPr id="5" name="圖片 5">
+            <a:extLst>
+              <a:ext uri="{FF2B5EF4-FFF2-40B4-BE49-F238E27FC236}">
+                <a16:creationId xmlns:a16="http://schemas.microsoft.com/office/drawing/2014/main" id="{8710CE38-9BAF-430B-8B84-F0E7F380F7E2}"/>
+              </a:ext>
+            </a:extLst>
+          </p:cNvPr>
+          <p:cNvPicPr>
+            <a:picLocks noChangeAspect="1"/>
+          </p:cNvPicPr>
+          <p:nvPr/>
+        </p:nvPicPr>
+        <p:blipFill>
+          <a:blip r:embed="rId4"/>
+          <a:stretch>
+            <a:fillRect/>
+          </a:stretch>
+        </p:blipFill>
+        <p:spPr>
+          <a:xfrm>
+            <a:off x="8831942" y="2396109"/>
+            <a:ext cx="2743200" cy="3633324"/>
+          </a:xfrm>
+          <a:prstGeom prst="rect">
+            <a:avLst/>
+          </a:prstGeom>
+          <a:ln w="28575">
+            <a:solidFill>
+              <a:srgbClr val="8CE1EB"/>
+            </a:solidFill>
+          </a:ln>
+        </p:spPr>
+      </p:pic>
+      <p:pic>
+        <p:nvPicPr>
+          <p:cNvPr id="6" name="圖片 6">
+            <a:extLst>
+              <a:ext uri="{FF2B5EF4-FFF2-40B4-BE49-F238E27FC236}">
+                <a16:creationId xmlns:a16="http://schemas.microsoft.com/office/drawing/2014/main" id="{FA372748-4FA0-4C2D-B686-566239BC9CC3}"/>
+              </a:ext>
+            </a:extLst>
+          </p:cNvPr>
+          <p:cNvPicPr>
+            <a:picLocks noChangeAspect="1"/>
+          </p:cNvPicPr>
+          <p:nvPr/>
+        </p:nvPicPr>
+        <p:blipFill>
+          <a:blip r:embed="rId5"/>
+          <a:stretch>
+            <a:fillRect/>
+          </a:stretch>
+        </p:blipFill>
+        <p:spPr>
+          <a:xfrm>
+            <a:off x="6364585" y="2155372"/>
+            <a:ext cx="1930257" cy="4114800"/>
+          </a:xfrm>
+          <a:prstGeom prst="rect">
+            <a:avLst/>
+          </a:prstGeom>
+          <a:ln w="28575">
+            <a:solidFill>
+              <a:srgbClr val="8CE1EB"/>
+            </a:solidFill>
+          </a:ln>
+        </p:spPr>
+      </p:pic>
+    </p:spTree>
+    <p:extLst>
+      <p:ext uri="{BB962C8B-B14F-4D97-AF65-F5344CB8AC3E}">
+        <p14:creationId xmlns:p14="http://schemas.microsoft.com/office/powerpoint/2010/main" val="1328007415"/>
+      </p:ext>
+    </p:extLst>
+  </p:cSld>
+  <p:clrMapOvr>
+    <a:masterClrMapping/>
+  </p:clrMapOvr>
+</p:sld>
+</file>
+
+<file path=ppt/slides/slide8.xml><?xml version="1.0" encoding="utf-8"?>
+<p:sld xmlns:a="http://schemas.openxmlformats.org/drawingml/2006/main" xmlns:r="http://schemas.openxmlformats.org/officeDocument/2006/relationships" xmlns:p="http://schemas.openxmlformats.org/presentationml/2006/main">
+  <p:cSld>
+    <p:spTree>
+      <p:nvGrpSpPr>
+        <p:cNvPr id="1" name=""/>
+        <p:cNvGrpSpPr/>
+        <p:nvPr/>
+      </p:nvGrpSpPr>
+      <p:grpSpPr>
+        <a:xfrm>
+          <a:off x="0" y="0"/>
+          <a:ext cx="0" cy="0"/>
+          <a:chOff x="0" y="0"/>
+          <a:chExt cx="0" cy="0"/>
+        </a:xfrm>
+      </p:grpSpPr>
+      <p:sp>
+        <p:nvSpPr>
+          <p:cNvPr id="2" name="標題 1">
+            <a:extLst>
+              <a:ext uri="{FF2B5EF4-FFF2-40B4-BE49-F238E27FC236}">
+                <a16:creationId xmlns:a16="http://schemas.microsoft.com/office/drawing/2014/main" id="{521FF66F-721D-4C58-AE64-FFE545614FD9}"/>
+              </a:ext>
+            </a:extLst>
+          </p:cNvPr>
+          <p:cNvSpPr>
+            <a:spLocks noGrp="1"/>
+          </p:cNvSpPr>
+          <p:nvPr>
+            <p:ph type="title"/>
+          </p:nvPr>
+        </p:nvSpPr>
+        <p:spPr>
+          <a:xfrm>
+            <a:off x="504372" y="205468"/>
+            <a:ext cx="11183256" cy="1325563"/>
+          </a:xfrm>
+        </p:spPr>
+        <p:txBody>
+          <a:bodyPr>
+            <a:normAutofit/>
+          </a:bodyPr>
+          <a:lstStyle/>
+          <a:p>
+            <a:pPr algn="ctr"/>
+            <a:r>
+              <a:rPr lang="zh-TW" altLang="en-US" sz="4800">
+                <a:solidFill>
+                  <a:srgbClr val="8CE1EB"/>
+                </a:solidFill>
+                <a:latin typeface="Verdana"/>
+                <a:ea typeface="新細明體"/>
+                <a:cs typeface="Calibri Light"/>
+              </a:rPr>
+              <a:t>Wireframes @ 1024px or higher</a:t>
+            </a:r>
+          </a:p>
+        </p:txBody>
+      </p:sp>
+      <p:pic>
+        <p:nvPicPr>
+          <p:cNvPr id="6" name="圖片 8" descr="一張含有 文字, 電子用品, 螢幕擷取畫面, 向量圖形 的圖片&#10;&#10;自動產生的描述">
+            <a:extLst>
+              <a:ext uri="{FF2B5EF4-FFF2-40B4-BE49-F238E27FC236}">
+                <a16:creationId xmlns:a16="http://schemas.microsoft.com/office/drawing/2014/main" id="{693380DF-D9E2-44A7-AF43-38582A636E12}"/>
+              </a:ext>
+            </a:extLst>
+          </p:cNvPr>
+          <p:cNvPicPr>
+            <a:picLocks noChangeAspect="1"/>
+          </p:cNvPicPr>
+          <p:nvPr/>
+        </p:nvPicPr>
+        <p:blipFill>
+          <a:blip r:embed="rId2"/>
+          <a:stretch>
+            <a:fillRect/>
+          </a:stretch>
+        </p:blipFill>
+        <p:spPr>
+          <a:xfrm>
+            <a:off x="4455886" y="2191058"/>
+            <a:ext cx="6959599" cy="4362742"/>
+          </a:xfrm>
+          <a:prstGeom prst="rect">
+            <a:avLst/>
+          </a:prstGeom>
+          <a:ln w="28575">
+            <a:solidFill>
+              <a:srgbClr val="8CE1EB"/>
+            </a:solidFill>
+          </a:ln>
+        </p:spPr>
+      </p:pic>
+      <p:sp>
+        <p:nvSpPr>
+          <p:cNvPr id="9" name="文字方塊 8">
+            <a:extLst>
+              <a:ext uri="{FF2B5EF4-FFF2-40B4-BE49-F238E27FC236}">
+                <a16:creationId xmlns:a16="http://schemas.microsoft.com/office/drawing/2014/main" id="{098346FA-CF50-4BAE-8AE7-0550EA8340B7}"/>
+              </a:ext>
+            </a:extLst>
+          </p:cNvPr>
+          <p:cNvSpPr txBox="1"/>
+          <p:nvPr/>
+        </p:nvSpPr>
+        <p:spPr>
+          <a:xfrm>
+            <a:off x="7119257" y="1357086"/>
+            <a:ext cx="1640114" cy="707886"/>
+          </a:xfrm>
+          <a:prstGeom prst="rect">
+            <a:avLst/>
+          </a:prstGeom>
+          <a:noFill/>
+        </p:spPr>
+        <p:txBody>
+          <a:bodyPr rot="0" spcFirstLastPara="0" vertOverflow="overflow" horzOverflow="overflow" vert="horz" wrap="square" lIns="91440" tIns="45720" rIns="91440" bIns="45720" numCol="1" spcCol="0" rtlCol="0" fromWordArt="0" anchor="t" anchorCtr="0" forceAA="0" compatLnSpc="1">
+            <a:prstTxWarp prst="textNoShape">
+              <a:avLst/>
+            </a:prstTxWarp>
+            <a:spAutoFit/>
+          </a:bodyPr>
+          <a:lstStyle/>
+          <a:p>
+            <a:pPr algn="l"/>
+            <a:r>
+              <a:rPr lang="zh-TW" altLang="en-US" sz="4000">
+                <a:solidFill>
+                  <a:srgbClr val="8CE1EB"/>
+                </a:solidFill>
+                <a:ea typeface="新細明體"/>
+              </a:rPr>
+              <a:t>Home</a:t>
+            </a:r>
+            <a:endParaRPr lang="zh-TW" altLang="en-US" sz="4000">
+              <a:solidFill>
+                <a:srgbClr val="8CE1EB"/>
+              </a:solidFill>
+            </a:endParaRPr>
+          </a:p>
+        </p:txBody>
+      </p:sp>
+      <p:pic>
+        <p:nvPicPr>
+          <p:cNvPr id="13" name="圖片 13" descr="一張含有 文字, 螢幕擷取畫面, 電子用品 的圖片&#10;&#10;自動產生的描述">
+            <a:extLst>
+              <a:ext uri="{FF2B5EF4-FFF2-40B4-BE49-F238E27FC236}">
+                <a16:creationId xmlns:a16="http://schemas.microsoft.com/office/drawing/2014/main" id="{07A343A1-50E4-49F4-A93A-752AC7EF879F}"/>
+              </a:ext>
+            </a:extLst>
+          </p:cNvPr>
+          <p:cNvPicPr>
+            <a:picLocks noChangeAspect="1"/>
+          </p:cNvPicPr>
+          <p:nvPr/>
+        </p:nvPicPr>
+        <p:blipFill>
+          <a:blip r:embed="rId3"/>
+          <a:stretch>
+            <a:fillRect/>
+          </a:stretch>
+        </p:blipFill>
+        <p:spPr>
+          <a:xfrm>
+            <a:off x="8338457" y="4180725"/>
+            <a:ext cx="3505200" cy="2096093"/>
+          </a:xfrm>
+          <a:prstGeom prst="rect">
+            <a:avLst/>
+          </a:prstGeom>
+        </p:spPr>
+      </p:pic>
+      <p:pic>
+        <p:nvPicPr>
+          <p:cNvPr id="14" name="圖片 22">
+            <a:extLst>
+              <a:ext uri="{FF2B5EF4-FFF2-40B4-BE49-F238E27FC236}">
+                <a16:creationId xmlns:a16="http://schemas.microsoft.com/office/drawing/2014/main" id="{E065BF51-8A63-437E-83A3-90028097227F}"/>
+              </a:ext>
+            </a:extLst>
+          </p:cNvPr>
+          <p:cNvPicPr>
+            <a:picLocks noChangeAspect="1"/>
+          </p:cNvPicPr>
+          <p:nvPr/>
+        </p:nvPicPr>
+        <p:blipFill>
+          <a:blip r:embed="rId4"/>
+          <a:stretch>
+            <a:fillRect/>
+          </a:stretch>
+        </p:blipFill>
+        <p:spPr>
+          <a:xfrm>
+            <a:off x="413657" y="2472320"/>
+            <a:ext cx="6103257" cy="3800215"/>
+          </a:xfrm>
+          <a:prstGeom prst="rect">
+            <a:avLst/>
+          </a:prstGeom>
+          <a:ln w="28575">
+            <a:solidFill>
+              <a:srgbClr val="8CE1EB"/>
+            </a:solidFill>
+          </a:ln>
+        </p:spPr>
+      </p:pic>
+      <p:sp>
+        <p:nvSpPr>
+          <p:cNvPr id="36" name="文字方塊 35">
+            <a:extLst>
+              <a:ext uri="{FF2B5EF4-FFF2-40B4-BE49-F238E27FC236}">
+                <a16:creationId xmlns:a16="http://schemas.microsoft.com/office/drawing/2014/main" id="{31E823DF-A23B-4E12-9F67-5C5C91A81423}"/>
+              </a:ext>
+            </a:extLst>
+          </p:cNvPr>
+          <p:cNvSpPr txBox="1"/>
+          <p:nvPr/>
+        </p:nvSpPr>
+        <p:spPr>
+          <a:xfrm>
+            <a:off x="2561770" y="1357085"/>
+            <a:ext cx="1807028" cy="707886"/>
+          </a:xfrm>
+          <a:prstGeom prst="rect">
+            <a:avLst/>
+          </a:prstGeom>
+          <a:noFill/>
+        </p:spPr>
+        <p:txBody>
+          <a:bodyPr rot="0" spcFirstLastPara="0" vertOverflow="overflow" horzOverflow="overflow" vert="horz" wrap="square" lIns="91440" tIns="45720" rIns="91440" bIns="45720" numCol="1" spcCol="0" rtlCol="0" fromWordArt="0" anchor="t" anchorCtr="0" forceAA="0" compatLnSpc="1">
+            <a:prstTxWarp prst="textNoShape">
+              <a:avLst/>
+            </a:prstTxWarp>
+            <a:spAutoFit/>
+          </a:bodyPr>
+          <a:lstStyle/>
+          <a:p>
+            <a:pPr algn="l"/>
+            <a:r>
+              <a:rPr lang="zh-TW" altLang="en-US" sz="4000">
+                <a:solidFill>
+                  <a:srgbClr val="8CE1EB"/>
+                </a:solidFill>
+                <a:ea typeface="新細明體"/>
+              </a:rPr>
+              <a:t>Contact</a:t>
+            </a:r>
+            <a:endParaRPr lang="zh-TW" altLang="en-US" sz="4000">
+              <a:solidFill>
+                <a:srgbClr val="8CE1EB"/>
+              </a:solidFill>
+            </a:endParaRPr>
+          </a:p>
+        </p:txBody>
+      </p:sp>
+      <p:sp>
+        <p:nvSpPr>
+          <p:cNvPr id="37" name="文字方塊 36">
+            <a:extLst>
+              <a:ext uri="{FF2B5EF4-FFF2-40B4-BE49-F238E27FC236}">
+                <a16:creationId xmlns:a16="http://schemas.microsoft.com/office/drawing/2014/main" id="{590A0D54-776E-4513-A4BE-3E3F090D46CC}"/>
+              </a:ext>
+            </a:extLst>
+          </p:cNvPr>
+          <p:cNvSpPr txBox="1"/>
+          <p:nvPr/>
+        </p:nvSpPr>
+        <p:spPr>
+          <a:xfrm>
+            <a:off x="9274628" y="1357085"/>
+            <a:ext cx="1640114" cy="707886"/>
+          </a:xfrm>
+          <a:prstGeom prst="rect">
+            <a:avLst/>
+          </a:prstGeom>
+          <a:noFill/>
+        </p:spPr>
+        <p:txBody>
+          <a:bodyPr rot="0" spcFirstLastPara="0" vertOverflow="overflow" horzOverflow="overflow" vert="horz" wrap="square" lIns="91440" tIns="45720" rIns="91440" bIns="45720" numCol="1" spcCol="0" rtlCol="0" fromWordArt="0" anchor="t" anchorCtr="0" forceAA="0" compatLnSpc="1">
+            <a:prstTxWarp prst="textNoShape">
+              <a:avLst/>
+            </a:prstTxWarp>
+            <a:spAutoFit/>
+          </a:bodyPr>
+          <a:lstStyle/>
+          <a:p>
+            <a:pPr algn="l"/>
+            <a:r>
+              <a:rPr lang="zh-TW" altLang="en-US" sz="4000">
+                <a:solidFill>
+                  <a:srgbClr val="8CE1EB"/>
+                </a:solidFill>
+                <a:ea typeface="新細明體"/>
+              </a:rPr>
+              <a:t>About</a:t>
+            </a:r>
+            <a:endParaRPr lang="zh-TW" altLang="en-US" sz="4000">
+              <a:solidFill>
+                <a:srgbClr val="8CE1EB"/>
+              </a:solidFill>
+            </a:endParaRPr>
+          </a:p>
+        </p:txBody>
+      </p:sp>
+    </p:spTree>
+    <p:extLst>
+      <p:ext uri="{BB962C8B-B14F-4D97-AF65-F5344CB8AC3E}">
+        <p14:creationId xmlns:p14="http://schemas.microsoft.com/office/powerpoint/2010/main" val="2125693125"/>
+      </p:ext>
+    </p:extLst>
+  </p:cSld>
+  <p:clrMapOvr>
+    <a:masterClrMapping/>
+  </p:clrMapOvr>
+  <p:timing>
+    <p:tnLst>
+      <p:par>
+        <p:cTn id="1" dur="indefinite" restart="never" nodeType="tmRoot">
+          <p:childTnLst>
+            <p:seq concurrent="1" nextAc="seek">
+              <p:cTn id="2" dur="indefinite" nodeType="mainSeq">
+                <p:childTnLst>
+                  <p:par>
+                    <p:cTn id="3" fill="hold">
+                      <p:stCondLst>
+                        <p:cond delay="indefinite"/>
+                      </p:stCondLst>
+                      <p:childTnLst>
+                        <p:par>
+                          <p:cTn id="4" fill="hold">
+                            <p:stCondLst>
+                              <p:cond delay="0"/>
+                            </p:stCondLst>
+                            <p:childTnLst>
+                              <p:par>
+                                <p:cTn id="5" presetID="1" presetClass="entr" presetSubtype="0" fill="hold" nodeType="clickEffect">
+                                  <p:stCondLst>
+                                    <p:cond delay="0"/>
+                                  </p:stCondLst>
+                                  <p:childTnLst>
+                                    <p:set>
+                                      <p:cBhvr>
+                                        <p:cTn id="6" dur="1" fill="hold">
+                                          <p:stCondLst>
+                                            <p:cond delay="0"/>
+                                          </p:stCondLst>
+                                        </p:cTn>
+                                        <p:tgtEl>
+                                          <p:spTgt spid="14"/>
+                                        </p:tgtEl>
+                                        <p:attrNameLst>
+                                          <p:attrName>style.visibility</p:attrName>
+                                        </p:attrNameLst>
+                                      </p:cBhvr>
+                                      <p:to>
+                                        <p:strVal val="visible"/>
+                                      </p:to>
+                                    </p:set>
+                                  </p:childTnLst>
+                                </p:cTn>
+                              </p:par>
+                            </p:childTnLst>
+                          </p:cTn>
+                        </p:par>
+                      </p:childTnLst>
+                    </p:cTn>
+                  </p:par>
+                  <p:par>
+                    <p:cTn id="7" fill="hold">
+                      <p:stCondLst>
+                        <p:cond delay="indefinite"/>
+                      </p:stCondLst>
+                      <p:childTnLst>
+                        <p:par>
+                          <p:cTn id="8" fill="hold">
+                            <p:stCondLst>
+                              <p:cond delay="0"/>
+                            </p:stCondLst>
+                            <p:childTnLst>
+                              <p:par>
+                                <p:cTn id="9" presetID="1" presetClass="entr" presetSubtype="0" fill="hold" nodeType="clickEffect">
+                                  <p:stCondLst>
+                                    <p:cond delay="0"/>
+                                  </p:stCondLst>
+                                  <p:childTnLst>
+                                    <p:set>
+                                      <p:cBhvr>
+                                        <p:cTn id="10" dur="1" fill="hold">
+                                          <p:stCondLst>
+                                            <p:cond delay="0"/>
+                                          </p:stCondLst>
+                                        </p:cTn>
+                                        <p:tgtEl>
+                                          <p:spTgt spid="6"/>
+                                        </p:tgtEl>
+                                        <p:attrNameLst>
+                                          <p:attrName>style.visibility</p:attrName>
+                                        </p:attrNameLst>
+                                      </p:cBhvr>
+                                      <p:to>
+                                        <p:strVal val="visible"/>
+                                      </p:to>
+                                    </p:set>
+                                  </p:childTnLst>
+                                </p:cTn>
+                              </p:par>
+                            </p:childTnLst>
+                          </p:cTn>
+                        </p:par>
+                      </p:childTnLst>
+                    </p:cTn>
+                  </p:par>
+                  <p:par>
+                    <p:cTn id="11" fill="hold">
+                      <p:stCondLst>
+                        <p:cond delay="indefinite"/>
+                      </p:stCondLst>
+                      <p:childTnLst>
+                        <p:par>
+                          <p:cTn id="12" fill="hold">
+                            <p:stCondLst>
+                              <p:cond delay="0"/>
+                            </p:stCondLst>
+                            <p:childTnLst>
+                              <p:par>
+                                <p:cTn id="13" presetID="1" presetClass="entr" presetSubtype="0" fill="hold" nodeType="clickEffect">
+                                  <p:stCondLst>
+                                    <p:cond delay="0"/>
+                                  </p:stCondLst>
+                                  <p:childTnLst>
+                                    <p:set>
+                                      <p:cBhvr>
+                                        <p:cTn id="14" dur="1" fill="hold">
+                                          <p:stCondLst>
+                                            <p:cond delay="0"/>
+                                          </p:stCondLst>
+                                        </p:cTn>
+                                        <p:tgtEl>
+                                          <p:spTgt spid="13"/>
+                                        </p:tgtEl>
+                                        <p:attrNameLst>
+                                          <p:attrName>style.visibility</p:attrName>
+                                        </p:attrNameLst>
+                                      </p:cBhvr>
+                                      <p:to>
+                                        <p:strVal val="visible"/>
+                                      </p:to>
+                                    </p:set>
+                                  </p:childTnLst>
+                                </p:cTn>
+                              </p:par>
+                            </p:childTnLst>
+                          </p:cTn>
+                        </p:par>
+                      </p:childTnLst>
+                    </p:cTn>
+                  </p:par>
+                </p:childTnLst>
+              </p:cTn>
+              <p:prevCondLst>
+                <p:cond evt="onPrev" delay="0">
+                  <p:tgtEl>
+                    <p:sldTgt/>
+                  </p:tgtEl>
+                </p:cond>
+              </p:prevCondLst>
+              <p:nextCondLst>
+                <p:cond evt="onNext" delay="0">
+                  <p:tgtEl>
+                    <p:sldTgt/>
+                  </p:tgtEl>
+                </p:cond>
+              </p:nextCondLst>
+            </p:seq>
+          </p:childTnLst>
+        </p:cTn>
+      </p:par>
+    </p:tnLst>
+  </p:timing>
+</p:sld>
+</file>
+
 <file path=ppt/slides/slide9.xml><?xml version="1.0" encoding="utf-8"?>
 <p:sld xmlns:a="http://schemas.openxmlformats.org/drawingml/2006/main" xmlns:r="http://schemas.openxmlformats.org/officeDocument/2006/relationships" xmlns:p="http://schemas.openxmlformats.org/presentationml/2006/main">
   <p:cSld>
@@ -7360,8 +7563,8 @@
         </p:nvSpPr>
         <p:spPr>
           <a:xfrm>
-            <a:off x="838200" y="205468"/>
-            <a:ext cx="10515600" cy="1325563"/>
+            <a:off x="504372" y="205468"/>
+            <a:ext cx="11183256" cy="1325563"/>
           </a:xfrm>
         </p:spPr>
         <p:txBody>
@@ -7380,25 +7583,87 @@
                 <a:ea typeface="新細明體"/>
                 <a:cs typeface="Calibri Light"/>
               </a:rPr>
-              <a:t>Components Used</a:t>
-            </a:r>
-            <a:endParaRPr lang="zh-TW" altLang="en-US" sz="4800" dirty="0">
-              <a:solidFill>
-                <a:srgbClr val="8CE1EB"/>
-              </a:solidFill>
-              <a:latin typeface="Verdana"/>
-              <a:ea typeface="新細明體"/>
-              <a:cs typeface="Calibri Light"/>
-            </a:endParaRPr>
-          </a:p>
-        </p:txBody>
-      </p:sp>
-      <p:sp>
-        <p:nvSpPr>
-          <p:cNvPr id="6" name="文字方塊 5">
+              <a:t>Wireframes @ 1024px or higher</a:t>
+            </a:r>
+          </a:p>
+        </p:txBody>
+      </p:sp>
+      <p:pic>
+        <p:nvPicPr>
+          <p:cNvPr id="5" name="圖片 6" descr="一張含有 文字, 螢幕擷取畫面, 電子用品 的圖片&#10;&#10;自動產生的描述">
             <a:extLst>
               <a:ext uri="{FF2B5EF4-FFF2-40B4-BE49-F238E27FC236}">
-                <a16:creationId xmlns:a16="http://schemas.microsoft.com/office/drawing/2014/main" id="{B66493C1-CFD2-44EF-9C7D-213EE2B96007}"/>
+                <a16:creationId xmlns:a16="http://schemas.microsoft.com/office/drawing/2014/main" id="{1E7B5690-3081-4E4A-BCAD-DF61FBADE105}"/>
+              </a:ext>
+            </a:extLst>
+          </p:cNvPr>
+          <p:cNvPicPr>
+            <a:picLocks noChangeAspect="1"/>
+          </p:cNvPicPr>
+          <p:nvPr/>
+        </p:nvPicPr>
+        <p:blipFill>
+          <a:blip r:embed="rId2"/>
+          <a:stretch>
+            <a:fillRect/>
+          </a:stretch>
+        </p:blipFill>
+        <p:spPr>
+          <a:xfrm>
+            <a:off x="384629" y="2396765"/>
+            <a:ext cx="5486400" cy="3878752"/>
+          </a:xfrm>
+          <a:prstGeom prst="rect">
+            <a:avLst/>
+          </a:prstGeom>
+          <a:ln w="28575">
+            <a:solidFill>
+              <a:srgbClr val="8CE1EB"/>
+            </a:solidFill>
+          </a:ln>
+        </p:spPr>
+      </p:pic>
+      <p:pic>
+        <p:nvPicPr>
+          <p:cNvPr id="7" name="圖片 7" descr="一張含有 文字, 電子用品, 螢幕擷取畫面 的圖片&#10;&#10;自動產生的描述">
+            <a:extLst>
+              <a:ext uri="{FF2B5EF4-FFF2-40B4-BE49-F238E27FC236}">
+                <a16:creationId xmlns:a16="http://schemas.microsoft.com/office/drawing/2014/main" id="{9F36F960-35E3-4D21-9D5C-55927C6B94FE}"/>
+              </a:ext>
+            </a:extLst>
+          </p:cNvPr>
+          <p:cNvPicPr>
+            <a:picLocks noChangeAspect="1"/>
+          </p:cNvPicPr>
+          <p:nvPr/>
+        </p:nvPicPr>
+        <p:blipFill>
+          <a:blip r:embed="rId3"/>
+          <a:stretch>
+            <a:fillRect/>
+          </a:stretch>
+        </p:blipFill>
+        <p:spPr>
+          <a:xfrm>
+            <a:off x="6320971" y="2398119"/>
+            <a:ext cx="5486400" cy="3876046"/>
+          </a:xfrm>
+          <a:prstGeom prst="rect">
+            <a:avLst/>
+          </a:prstGeom>
+          <a:ln w="28575">
+            <a:solidFill>
+              <a:srgbClr val="8CE1EB"/>
+            </a:solidFill>
+          </a:ln>
+        </p:spPr>
+      </p:pic>
+      <p:sp>
+        <p:nvSpPr>
+          <p:cNvPr id="8" name="文字方塊 7">
+            <a:extLst>
+              <a:ext uri="{FF2B5EF4-FFF2-40B4-BE49-F238E27FC236}">
+                <a16:creationId xmlns:a16="http://schemas.microsoft.com/office/drawing/2014/main" id="{2242D533-C4A7-4F8B-A5D0-54FED0C84244}"/>
               </a:ext>
             </a:extLst>
           </p:cNvPr>
@@ -7407,8 +7672,8 @@
         </p:nvSpPr>
         <p:spPr>
           <a:xfrm>
-            <a:off x="2576912" y="1800585"/>
-            <a:ext cx="2743200" cy="4401205"/>
+            <a:off x="2039256" y="1444171"/>
+            <a:ext cx="2184399" cy="707886"/>
           </a:xfrm>
           <a:prstGeom prst="rect">
             <a:avLst/>
@@ -7424,134 +7689,30 @@
           </a:bodyPr>
           <a:lstStyle/>
           <a:p>
-            <a:r>
-              <a:rPr lang="zh-TW" altLang="en-US" sz="2800">
+            <a:pPr algn="l"/>
+            <a:r>
+              <a:rPr lang="zh-TW" altLang="en-US" sz="4000">
                 <a:solidFill>
                   <a:srgbClr val="8CE1EB"/>
                 </a:solidFill>
                 <a:ea typeface="新細明體"/>
-                <a:cs typeface="Calibri"/>
               </a:rPr>
-              <a:t>&lt;figure&gt;</a:t>
-            </a:r>
-          </a:p>
-          <a:p>
-            <a:r>
-              <a:rPr lang="zh-TW" altLang="en-US" sz="2800">
-                <a:solidFill>
-                  <a:srgbClr val="8CE1EB"/>
-                </a:solidFill>
-                <a:ea typeface="新細明體"/>
-                <a:cs typeface="Calibri"/>
-              </a:rPr>
-              <a:t>&lt;img&gt;</a:t>
-            </a:r>
-          </a:p>
-          <a:p>
-            <a:r>
-              <a:rPr lang="zh-TW" altLang="en-US" sz="2800">
-                <a:solidFill>
-                  <a:srgbClr val="8CE1EB"/>
-                </a:solidFill>
-                <a:ea typeface="新細明體"/>
-                <a:cs typeface="Calibri"/>
-              </a:rPr>
-              <a:t>&lt;figcaption&gt;</a:t>
-            </a:r>
-          </a:p>
-          <a:p>
-            <a:r>
-              <a:rPr lang="zh-TW" altLang="en-US" sz="2800">
-                <a:solidFill>
-                  <a:srgbClr val="8CE1EB"/>
-                </a:solidFill>
-                <a:ea typeface="新細明體"/>
-                <a:cs typeface="Calibri"/>
-              </a:rPr>
-              <a:t>&lt;video&gt;</a:t>
-            </a:r>
-          </a:p>
-          <a:p>
-            <a:r>
-              <a:rPr lang="zh-TW" altLang="en-US" sz="2800">
-                <a:solidFill>
-                  <a:srgbClr val="8CE1EB"/>
-                </a:solidFill>
-                <a:ea typeface="新細明體"/>
-                <a:cs typeface="Calibri"/>
-              </a:rPr>
-              <a:t>&lt;form&gt;</a:t>
-            </a:r>
-          </a:p>
-          <a:p>
-            <a:r>
-              <a:rPr lang="zh-TW" altLang="en-US" sz="2800">
-                <a:solidFill>
-                  <a:srgbClr val="8CE1EB"/>
-                </a:solidFill>
-                <a:ea typeface="新細明體"/>
-                <a:cs typeface="Calibri"/>
-              </a:rPr>
-              <a:t>&lt;label&gt;</a:t>
-            </a:r>
-          </a:p>
-          <a:p>
-            <a:r>
-              <a:rPr lang="zh-TW" altLang="en-US" sz="2800">
-                <a:solidFill>
-                  <a:srgbClr val="8CE1EB"/>
-                </a:solidFill>
-                <a:ea typeface="新細明體"/>
-                <a:cs typeface="Calibri"/>
-              </a:rPr>
-              <a:t>&lt;input&gt;</a:t>
-            </a:r>
-          </a:p>
-          <a:p>
-            <a:r>
-              <a:rPr lang="zh-TW" altLang="en-US" sz="2800">
-                <a:solidFill>
-                  <a:srgbClr val="8CE1EB"/>
-                </a:solidFill>
-                <a:ea typeface="新細明體"/>
-                <a:cs typeface="Calibri"/>
-              </a:rPr>
-              <a:t>&lt;textarea&gt;</a:t>
-            </a:r>
-          </a:p>
-          <a:p>
-            <a:r>
-              <a:rPr lang="zh-TW" altLang="en-US" sz="2800">
-                <a:solidFill>
-                  <a:srgbClr val="8CE1EB"/>
-                </a:solidFill>
-                <a:ea typeface="新細明體"/>
-                <a:cs typeface="Calibri"/>
-              </a:rPr>
-              <a:t>&lt;button&gt;</a:t>
-            </a:r>
-            <a:endParaRPr lang="zh-TW" altLang="en-US" sz="2800" dirty="0">
+              <a:t>Portfolio</a:t>
+            </a:r>
+            <a:endParaRPr lang="zh-TW" altLang="en-US" sz="4000">
               <a:solidFill>
                 <a:srgbClr val="8CE1EB"/>
               </a:solidFill>
-              <a:ea typeface="新細明體"/>
-              <a:cs typeface="Calibri"/>
             </a:endParaRPr>
           </a:p>
-          <a:p>
-            <a:endParaRPr lang="zh-TW" altLang="en-US" sz="2800" dirty="0">
-              <a:ea typeface="新細明體"/>
-              <a:cs typeface="Calibri"/>
-            </a:endParaRPr>
-          </a:p>
-        </p:txBody>
-      </p:sp>
-      <p:sp>
-        <p:nvSpPr>
-          <p:cNvPr id="4" name="文字方塊 3">
+        </p:txBody>
+      </p:sp>
+      <p:sp>
+        <p:nvSpPr>
+          <p:cNvPr id="11" name="文字方塊 10">
             <a:extLst>
               <a:ext uri="{FF2B5EF4-FFF2-40B4-BE49-F238E27FC236}">
-                <a16:creationId xmlns:a16="http://schemas.microsoft.com/office/drawing/2014/main" id="{6402DABD-FB2A-40C3-AE5F-67C3ED909F6D}"/>
+                <a16:creationId xmlns:a16="http://schemas.microsoft.com/office/drawing/2014/main" id="{02184437-5F47-4999-8152-CCF82A53973F}"/>
               </a:ext>
             </a:extLst>
           </p:cNvPr>
@@ -7560,8 +7721,8 @@
         </p:nvSpPr>
         <p:spPr>
           <a:xfrm>
-            <a:off x="5322739" y="1800585"/>
-            <a:ext cx="2743200" cy="3970318"/>
+            <a:off x="8411027" y="1444170"/>
+            <a:ext cx="1313542" cy="707886"/>
           </a:xfrm>
           <a:prstGeom prst="rect">
             <a:avLst/>
@@ -7577,261 +7738,20 @@
           </a:bodyPr>
           <a:lstStyle/>
           <a:p>
-            <a:r>
-              <a:rPr lang="zh-TW" altLang="en-US" sz="2800">
+            <a:pPr algn="l"/>
+            <a:r>
+              <a:rPr lang="zh-TW" altLang="en-US" sz="4000">
                 <a:solidFill>
                   <a:srgbClr val="8CE1EB"/>
                 </a:solidFill>
                 <a:ea typeface="新細明體"/>
-                <a:cs typeface="Calibri"/>
               </a:rPr>
-              <a:t>&lt;h1&gt;</a:t>
-            </a:r>
-          </a:p>
-          <a:p>
-            <a:r>
-              <a:rPr lang="zh-TW" altLang="en-US" sz="2800">
-                <a:solidFill>
-                  <a:srgbClr val="8CE1EB"/>
-                </a:solidFill>
-                <a:ea typeface="新細明體"/>
-                <a:cs typeface="Calibri"/>
-              </a:rPr>
-              <a:t>&lt;h2&gt;</a:t>
-            </a:r>
-          </a:p>
-          <a:p>
-            <a:r>
-              <a:rPr lang="zh-TW" altLang="en-US" sz="2800">
-                <a:solidFill>
-                  <a:srgbClr val="8CE1EB"/>
-                </a:solidFill>
-                <a:ea typeface="新細明體"/>
-                <a:cs typeface="Calibri"/>
-              </a:rPr>
-              <a:t>&lt;h3&gt;</a:t>
-            </a:r>
-          </a:p>
-          <a:p>
-            <a:r>
-              <a:rPr lang="zh-TW" altLang="en-US" sz="2800">
-                <a:solidFill>
-                  <a:srgbClr val="8CE1EB"/>
-                </a:solidFill>
-                <a:ea typeface="新細明體"/>
-                <a:cs typeface="Calibri"/>
-              </a:rPr>
-              <a:t>&lt;p&gt;</a:t>
-            </a:r>
-          </a:p>
-          <a:p>
-            <a:r>
-              <a:rPr lang="zh-TW" sz="2800">
-                <a:solidFill>
-                  <a:srgbClr val="8CE1EB"/>
-                </a:solidFill>
-                <a:ea typeface="+mn-lt"/>
-                <a:cs typeface="+mn-lt"/>
-              </a:rPr>
-              <a:t>&lt;a&gt;</a:t>
-            </a:r>
-            <a:endParaRPr lang="zh-TW">
-              <a:ea typeface="+mn-lt"/>
-              <a:cs typeface="+mn-lt"/>
-            </a:endParaRPr>
-          </a:p>
-          <a:p>
-            <a:r>
-              <a:rPr lang="en-US" altLang="zh-TW" sz="2800">
-                <a:solidFill>
-                  <a:srgbClr val="8CE1EB"/>
-                </a:solidFill>
-                <a:ea typeface="新細明體"/>
-                <a:cs typeface="Calibri"/>
-              </a:rPr>
-              <a:t>&lt;section&gt;</a:t>
-            </a:r>
-            <a:endParaRPr lang="zh-TW" altLang="en-US" sz="2800" dirty="0">
+              <a:t>Blog</a:t>
+            </a:r>
+            <a:endParaRPr lang="zh-TW" altLang="en-US" sz="4000">
               <a:solidFill>
                 <a:srgbClr val="8CE1EB"/>
               </a:solidFill>
-              <a:ea typeface="新細明體"/>
-              <a:cs typeface="Calibri"/>
-            </a:endParaRPr>
-          </a:p>
-          <a:p>
-            <a:r>
-              <a:rPr lang="en-US" altLang="zh-TW" sz="2800">
-                <a:solidFill>
-                  <a:srgbClr val="8CE1EB"/>
-                </a:solidFill>
-                <a:ea typeface="新細明體"/>
-                <a:cs typeface="Calibri"/>
-              </a:rPr>
-              <a:t>&lt;div&gt;</a:t>
-            </a:r>
-            <a:endParaRPr lang="zh-TW" sz="2800" dirty="0">
-              <a:solidFill>
-                <a:srgbClr val="8CE1EB"/>
-              </a:solidFill>
-              <a:ea typeface="新細明體"/>
-              <a:cs typeface="Calibri"/>
-            </a:endParaRPr>
-          </a:p>
-          <a:p>
-            <a:r>
-              <a:rPr lang="zh-TW" sz="2800">
-                <a:solidFill>
-                  <a:srgbClr val="8CE1EB"/>
-                </a:solidFill>
-                <a:ea typeface="+mn-lt"/>
-                <a:cs typeface="+mn-lt"/>
-              </a:rPr>
-              <a:t>&lt;span&gt;</a:t>
-            </a:r>
-            <a:endParaRPr lang="zh-TW">
-              <a:ea typeface="+mn-lt"/>
-              <a:cs typeface="+mn-lt"/>
-            </a:endParaRPr>
-          </a:p>
-          <a:p>
-            <a:endParaRPr lang="zh-TW" altLang="en-US" sz="2800" dirty="0">
-              <a:ea typeface="新細明體"/>
-              <a:cs typeface="Calibri"/>
-            </a:endParaRPr>
-          </a:p>
-        </p:txBody>
-      </p:sp>
-      <p:sp>
-        <p:nvSpPr>
-          <p:cNvPr id="7" name="文字方塊 6">
-            <a:extLst>
-              <a:ext uri="{FF2B5EF4-FFF2-40B4-BE49-F238E27FC236}">
-                <a16:creationId xmlns:a16="http://schemas.microsoft.com/office/drawing/2014/main" id="{09FF3FDF-AE01-4A76-ABEF-8034E4ED318A}"/>
-              </a:ext>
-            </a:extLst>
-          </p:cNvPr>
-          <p:cNvSpPr txBox="1"/>
-          <p:nvPr/>
-        </p:nvSpPr>
-        <p:spPr>
-          <a:xfrm>
-            <a:off x="8068566" y="1800585"/>
-            <a:ext cx="2743200" cy="3108543"/>
-          </a:xfrm>
-          <a:prstGeom prst="rect">
-            <a:avLst/>
-          </a:prstGeom>
-          <a:noFill/>
-        </p:spPr>
-        <p:txBody>
-          <a:bodyPr rot="0" spcFirstLastPara="0" vertOverflow="overflow" horzOverflow="overflow" vert="horz" wrap="square" lIns="91440" tIns="45720" rIns="91440" bIns="45720" numCol="1" spcCol="0" rtlCol="0" fromWordArt="0" anchor="t" anchorCtr="0" forceAA="0" compatLnSpc="1">
-            <a:prstTxWarp prst="textNoShape">
-              <a:avLst/>
-            </a:prstTxWarp>
-            <a:spAutoFit/>
-          </a:bodyPr>
-          <a:lstStyle/>
-          <a:p>
-            <a:r>
-              <a:rPr lang="zh-TW" altLang="en-US" sz="2800">
-                <a:solidFill>
-                  <a:srgbClr val="8CE1EB"/>
-                </a:solidFill>
-                <a:ea typeface="新細明體"/>
-                <a:cs typeface="Calibri"/>
-              </a:rPr>
-              <a:t>&lt;header&gt;</a:t>
-            </a:r>
-          </a:p>
-          <a:p>
-            <a:r>
-              <a:rPr lang="zh-TW" altLang="en-US" sz="2800">
-                <a:solidFill>
-                  <a:srgbClr val="8CE1EB"/>
-                </a:solidFill>
-                <a:ea typeface="新細明體"/>
-                <a:cs typeface="Calibri"/>
-              </a:rPr>
-              <a:t>&lt;nav&gt;</a:t>
-            </a:r>
-          </a:p>
-          <a:p>
-            <a:r>
-              <a:rPr lang="zh-TW" altLang="en-US" sz="2800">
-                <a:solidFill>
-                  <a:srgbClr val="8CE1EB"/>
-                </a:solidFill>
-                <a:ea typeface="新細明體"/>
-                <a:cs typeface="Calibri"/>
-              </a:rPr>
-              <a:t>&lt;main&gt;</a:t>
-            </a:r>
-          </a:p>
-          <a:p>
-            <a:r>
-              <a:rPr lang="zh-TW" altLang="en-US" sz="2800">
-                <a:solidFill>
-                  <a:srgbClr val="8CE1EB"/>
-                </a:solidFill>
-                <a:ea typeface="新細明體"/>
-                <a:cs typeface="Calibri"/>
-              </a:rPr>
-              <a:t>&lt;aside&gt;</a:t>
-            </a:r>
-          </a:p>
-          <a:p>
-            <a:r>
-              <a:rPr lang="zh-TW" sz="2800">
-                <a:solidFill>
-                  <a:srgbClr val="8CE1EB"/>
-                </a:solidFill>
-                <a:ea typeface="+mn-lt"/>
-                <a:cs typeface="+mn-lt"/>
-              </a:rPr>
-              <a:t>&lt;</a:t>
-            </a:r>
-            <a:r>
-              <a:rPr lang="en-US" altLang="zh-TW" sz="2800">
-                <a:solidFill>
-                  <a:srgbClr val="8CE1EB"/>
-                </a:solidFill>
-                <a:ea typeface="+mn-lt"/>
-                <a:cs typeface="+mn-lt"/>
-              </a:rPr>
-              <a:t>footer</a:t>
-            </a:r>
-            <a:r>
-              <a:rPr lang="zh-TW" sz="2800">
-                <a:solidFill>
-                  <a:srgbClr val="8CE1EB"/>
-                </a:solidFill>
-                <a:ea typeface="+mn-lt"/>
-                <a:cs typeface="+mn-lt"/>
-              </a:rPr>
-              <a:t>&gt;</a:t>
-            </a:r>
-            <a:endParaRPr lang="zh-TW">
-              <a:ea typeface="+mn-lt"/>
-              <a:cs typeface="+mn-lt"/>
-            </a:endParaRPr>
-          </a:p>
-          <a:p>
-            <a:endParaRPr lang="en-US" altLang="zh-TW" sz="2800" dirty="0">
-              <a:solidFill>
-                <a:srgbClr val="8CE1EB"/>
-              </a:solidFill>
-              <a:ea typeface="新細明體"/>
-              <a:cs typeface="Calibri"/>
-            </a:endParaRPr>
-          </a:p>
-          <a:p>
-            <a:endParaRPr lang="zh-TW" altLang="en-US" sz="2800" dirty="0">
-              <a:solidFill>
-                <a:srgbClr val="000000"/>
-              </a:solidFill>
-              <a:ea typeface="新細明體"/>
-              <a:cs typeface="+mn-lt"/>
             </a:endParaRPr>
           </a:p>
         </p:txBody>
@@ -7839,7 +7759,7 @@
     </p:spTree>
     <p:extLst>
       <p:ext uri="{BB962C8B-B14F-4D97-AF65-F5344CB8AC3E}">
-        <p14:creationId xmlns:p14="http://schemas.microsoft.com/office/powerpoint/2010/main" val="4246733124"/>
+        <p14:creationId xmlns:p14="http://schemas.microsoft.com/office/powerpoint/2010/main" val="3987598738"/>
       </p:ext>
     </p:extLst>
   </p:cSld>

</xml_diff>